<commit_message>
Doc + suppression de tuxguitar
</commit_message>
<xml_diff>
--- a/Docs/Présentation-PFE.pptx
+++ b/Docs/Présentation-PFE.pptx
@@ -5,7 +5,7 @@
     <p:sldMasterId id="2147483660" r:id="rId1"/>
   </p:sldMasterIdLst>
   <p:notesMasterIdLst>
-    <p:notesMasterId r:id="rId15"/>
+    <p:notesMasterId r:id="rId18"/>
   </p:notesMasterIdLst>
   <p:sldIdLst>
     <p:sldId id="256" r:id="rId2"/>
@@ -13,14 +13,17 @@
     <p:sldId id="260" r:id="rId4"/>
     <p:sldId id="258" r:id="rId5"/>
     <p:sldId id="261" r:id="rId6"/>
-    <p:sldId id="262" r:id="rId7"/>
-    <p:sldId id="263" r:id="rId8"/>
-    <p:sldId id="264" r:id="rId9"/>
-    <p:sldId id="265" r:id="rId10"/>
-    <p:sldId id="266" r:id="rId11"/>
-    <p:sldId id="267" r:id="rId12"/>
-    <p:sldId id="268" r:id="rId13"/>
-    <p:sldId id="259" r:id="rId14"/>
+    <p:sldId id="269" r:id="rId7"/>
+    <p:sldId id="271" r:id="rId8"/>
+    <p:sldId id="262" r:id="rId9"/>
+    <p:sldId id="263" r:id="rId10"/>
+    <p:sldId id="264" r:id="rId11"/>
+    <p:sldId id="265" r:id="rId12"/>
+    <p:sldId id="272" r:id="rId13"/>
+    <p:sldId id="266" r:id="rId14"/>
+    <p:sldId id="267" r:id="rId15"/>
+    <p:sldId id="268" r:id="rId16"/>
+    <p:sldId id="259" r:id="rId17"/>
   </p:sldIdLst>
   <p:sldSz cx="12192000" cy="6858000"/>
   <p:notesSz cx="6858000" cy="9144000"/>
@@ -209,7 +212,7 @@
           <a:p>
             <a:fld id="{4325ECA2-B8A4-4F53-AFD2-5717D83ED502}" type="datetimeFigureOut">
               <a:rPr lang="fr-FR" smtClean="0"/>
-              <a:t>02/02/2016</a:t>
+              <a:t>03/02/2016</a:t>
             </a:fld>
             <a:endParaRPr lang="fr-FR"/>
           </a:p>
@@ -1482,7 +1485,7 @@
           <a:p>
             <a:fld id="{5DD406B2-B765-4C86-8B2F-F7185F38B849}" type="slidenum">
               <a:rPr lang="fr-FR" smtClean="0"/>
-              <a:t>6</a:t>
+              <a:t>8</a:t>
             </a:fld>
             <a:endParaRPr lang="fr-FR"/>
           </a:p>
@@ -1580,7 +1583,7 @@
           <a:p>
             <a:fld id="{5DD406B2-B765-4C86-8B2F-F7185F38B849}" type="slidenum">
               <a:rPr lang="fr-FR" smtClean="0"/>
-              <a:t>7</a:t>
+              <a:t>9</a:t>
             </a:fld>
             <a:endParaRPr lang="fr-FR"/>
           </a:p>
@@ -1691,7 +1694,7 @@
           <a:p>
             <a:fld id="{5DD406B2-B765-4C86-8B2F-F7185F38B849}" type="slidenum">
               <a:rPr lang="fr-FR" smtClean="0"/>
-              <a:t>8</a:t>
+              <a:t>10</a:t>
             </a:fld>
             <a:endParaRPr lang="fr-FR"/>
           </a:p>
@@ -1860,7 +1863,7 @@
           <a:p>
             <a:fld id="{5DD406B2-B765-4C86-8B2F-F7185F38B849}" type="slidenum">
               <a:rPr lang="fr-FR" smtClean="0"/>
-              <a:t>9</a:t>
+              <a:t>11</a:t>
             </a:fld>
             <a:endParaRPr lang="fr-FR"/>
           </a:p>
@@ -1908,14 +1911,183 @@
         </p:nvSpPr>
         <p:spPr/>
       </p:sp>
-      <p:sp>
-        <p:nvSpPr>
-          <p:cNvPr id="3" name="Espace réservé des commentaires 2"/>
+      <mc:AlternateContent xmlns:mc="http://schemas.openxmlformats.org/markup-compatibility/2006">
+        <mc:Choice xmlns:a14="http://schemas.microsoft.com/office/drawing/2010/main" Requires="a14">
+          <p:sp>
+            <p:nvSpPr>
+              <p:cNvPr id="3" name="Espace réservé des commentaires 2"/>
+              <p:cNvSpPr>
+                <a:spLocks noGrp="1"/>
+              </p:cNvSpPr>
+              <p:nvPr>
+                <p:ph type="body" idx="1"/>
+              </p:nvPr>
+            </p:nvSpPr>
+            <p:spPr/>
+            <p:txBody>
+              <a:bodyPr/>
+              <a:lstStyle/>
+              <a:p>
+                <a14:m>
+                  <m:oMathPara xmlns:m="http://schemas.openxmlformats.org/officeDocument/2006/math">
+                    <m:oMathParaPr>
+                      <m:jc m:val="centerGroup"/>
+                    </m:oMathParaPr>
+                    <m:oMath xmlns:m="http://schemas.openxmlformats.org/officeDocument/2006/math">
+                      <m:d>
+                        <m:dPr>
+                          <m:begChr m:val="|"/>
+                          <m:endChr m:val="|"/>
+                          <m:ctrlPr>
+                            <a:rPr lang="fr-FR" i="1" smtClean="0">
+                              <a:latin typeface="Cambria Math" panose="02040503050406030204" pitchFamily="18" charset="0"/>
+                            </a:rPr>
+                          </m:ctrlPr>
+                        </m:dPr>
+                        <m:e>
+                          <m:sSub>
+                            <m:sSubPr>
+                              <m:ctrlPr>
+                                <a:rPr lang="fr-FR" i="1" smtClean="0">
+                                  <a:latin typeface="Cambria Math" panose="02040503050406030204" pitchFamily="18" charset="0"/>
+                                </a:rPr>
+                              </m:ctrlPr>
+                            </m:sSubPr>
+                            <m:e>
+                              <m:r>
+                                <a:rPr lang="fr-FR" b="0" i="1" smtClean="0">
+                                  <a:latin typeface="Cambria Math" panose="02040503050406030204" pitchFamily="18" charset="0"/>
+                                </a:rPr>
+                                <m:t>𝑙𝑜𝑔</m:t>
+                              </m:r>
+                            </m:e>
+                            <m:sub>
+                              <m:r>
+                                <a:rPr lang="fr-FR" b="0" i="1" smtClean="0">
+                                  <a:latin typeface="Cambria Math" panose="02040503050406030204" pitchFamily="18" charset="0"/>
+                                </a:rPr>
+                                <m:t>2</m:t>
+                              </m:r>
+                            </m:sub>
+                          </m:sSub>
+                          <m:d>
+                            <m:dPr>
+                              <m:ctrlPr>
+                                <a:rPr lang="fr-FR" i="1" smtClean="0">
+                                  <a:latin typeface="Cambria Math" panose="02040503050406030204" pitchFamily="18" charset="0"/>
+                                </a:rPr>
+                              </m:ctrlPr>
+                            </m:dPr>
+                            <m:e>
+                              <m:f>
+                                <m:fPr>
+                                  <m:ctrlPr>
+                                    <a:rPr lang="fr-FR" i="1" smtClean="0">
+                                      <a:latin typeface="Cambria Math" panose="02040503050406030204" pitchFamily="18" charset="0"/>
+                                    </a:rPr>
+                                  </m:ctrlPr>
+                                </m:fPr>
+                                <m:num>
+                                  <m:r>
+                                    <a:rPr lang="fr-FR" b="0" i="1" smtClean="0">
+                                      <a:latin typeface="Cambria Math" panose="02040503050406030204" pitchFamily="18" charset="0"/>
+                                    </a:rPr>
+                                    <m:t>𝑇𝑒𝑚𝑝𝑜</m:t>
+                                  </m:r>
+                                  <m:r>
+                                    <a:rPr lang="fr-FR" b="0" i="1" smtClean="0">
+                                      <a:latin typeface="Cambria Math" panose="02040503050406030204" pitchFamily="18" charset="0"/>
+                                    </a:rPr>
+                                    <m:t> </m:t>
+                                  </m:r>
+                                  <m:r>
+                                    <a:rPr lang="fr-FR" b="0" i="1" smtClean="0">
+                                      <a:latin typeface="Cambria Math" panose="02040503050406030204" pitchFamily="18" charset="0"/>
+                                    </a:rPr>
+                                    <m:t>𝑒𝑠𝑡𝑖𝑚</m:t>
+                                  </m:r>
+                                  <m:r>
+                                    <a:rPr lang="fr-FR" b="0" i="1" smtClean="0">
+                                      <a:latin typeface="Cambria Math" panose="02040503050406030204" pitchFamily="18" charset="0"/>
+                                    </a:rPr>
+                                    <m:t>é</m:t>
+                                  </m:r>
+                                </m:num>
+                                <m:den>
+                                  <m:r>
+                                    <a:rPr lang="fr-FR" b="0" i="1" smtClean="0">
+                                      <a:latin typeface="Cambria Math" panose="02040503050406030204" pitchFamily="18" charset="0"/>
+                                    </a:rPr>
+                                    <m:t>𝑇𝑒𝑚𝑝𝑜</m:t>
+                                  </m:r>
+                                  <m:r>
+                                    <a:rPr lang="fr-FR" b="0" i="1" smtClean="0">
+                                      <a:latin typeface="Cambria Math" panose="02040503050406030204" pitchFamily="18" charset="0"/>
+                                    </a:rPr>
+                                    <m:t> </m:t>
+                                  </m:r>
+                                  <m:r>
+                                    <a:rPr lang="fr-FR" b="0" i="1" smtClean="0">
+                                      <a:latin typeface="Cambria Math" panose="02040503050406030204" pitchFamily="18" charset="0"/>
+                                    </a:rPr>
+                                    <m:t>𝑎𝑡𝑡𝑒𝑛𝑑𝑢</m:t>
+                                  </m:r>
+                                </m:den>
+                              </m:f>
+                            </m:e>
+                          </m:d>
+                        </m:e>
+                      </m:d>
+                    </m:oMath>
+                  </m:oMathPara>
+                </a14:m>
+                <a:endParaRPr lang="fr-FR" dirty="0"/>
+              </a:p>
+            </p:txBody>
+          </p:sp>
+        </mc:Choice>
+        <mc:Fallback>
+          <p:sp>
+            <p:nvSpPr>
+              <p:cNvPr id="3" name="Espace réservé des commentaires 2"/>
+              <p:cNvSpPr>
+                <a:spLocks noGrp="1"/>
+              </p:cNvSpPr>
+              <p:nvPr>
+                <p:ph type="body" idx="1"/>
+              </p:nvPr>
+            </p:nvSpPr>
+            <p:spPr/>
+            <p:txBody>
+              <a:bodyPr/>
+              <a:lstStyle/>
+              <a:p>
+                <a:r>
+                  <a:rPr lang="fr-FR" i="0" smtClean="0">
+                    <a:latin typeface="Cambria Math" panose="02040503050406030204" pitchFamily="18" charset="0"/>
+                  </a:rPr>
+                  <a:t>|〖</a:t>
+                </a:r>
+                <a:r>
+                  <a:rPr lang="fr-FR" b="0" i="0" smtClean="0">
+                    <a:latin typeface="Cambria Math" panose="02040503050406030204" pitchFamily="18" charset="0"/>
+                  </a:rPr>
+                  <a:t>𝑙𝑜𝑔〗_2 ((𝑇𝑒𝑚𝑝𝑜 𝑒𝑠𝑡𝑖𝑚é)/(𝑇𝑒𝑚𝑝𝑜 𝑎𝑡𝑡𝑒𝑛𝑑𝑢))|</a:t>
+                </a:r>
+                <a:endParaRPr lang="fr-FR" dirty="0"/>
+              </a:p>
+            </p:txBody>
+          </p:sp>
+        </mc:Fallback>
+      </mc:AlternateContent>
+      <p:sp>
+        <p:nvSpPr>
+          <p:cNvPr id="4" name="Espace réservé du numéro de diapositive 3"/>
           <p:cNvSpPr>
             <a:spLocks noGrp="1"/>
           </p:cNvSpPr>
           <p:nvPr>
-            <p:ph type="body" idx="1"/>
+            <p:ph type="sldNum" sz="quarter" idx="10"/>
           </p:nvPr>
         </p:nvSpPr>
         <p:spPr/>
@@ -1923,71 +2095,9 @@
           <a:bodyPr/>
           <a:lstStyle/>
           <a:p>
-            <a:r>
-              <a:rPr lang="fr-FR" dirty="0" smtClean="0"/>
-              <a:t>Savoir le tempo nous permet de passer des secondes à</a:t>
-            </a:r>
-            <a:r>
-              <a:rPr lang="fr-FR" baseline="0" dirty="0" smtClean="0"/>
-              <a:t> la base</a:t>
-            </a:r>
-            <a:r>
-              <a:rPr lang="fr-FR" dirty="0" smtClean="0"/>
-              <a:t> « nombre de double croches ».</a:t>
-            </a:r>
-          </a:p>
-          <a:p>
-            <a:r>
-              <a:rPr lang="fr-FR" dirty="0" smtClean="0"/>
-              <a:t>On</a:t>
-            </a:r>
-            <a:r>
-              <a:rPr lang="fr-FR" baseline="0" dirty="0" smtClean="0"/>
-              <a:t> arrondie pas directement le résultat.</a:t>
-            </a:r>
-          </a:p>
-          <a:p>
-            <a:endParaRPr lang="fr-FR" baseline="0" dirty="0" smtClean="0"/>
-          </a:p>
-          <a:p>
-            <a:r>
-              <a:rPr lang="fr-FR" baseline="0" dirty="0" smtClean="0"/>
-              <a:t>Difficile de trouver la probabilité dans la littérature</a:t>
-            </a:r>
-          </a:p>
-          <a:p>
-            <a:r>
-              <a:rPr lang="fr-FR" baseline="0" dirty="0" smtClean="0"/>
-              <a:t>Nous avons ajusté les valeurs pour améliorer les résultats (empirique ou triche?) </a:t>
-            </a:r>
-            <a:r>
-              <a:rPr lang="fr-FR" baseline="0" dirty="0" smtClean="0">
-                <a:sym typeface="Wingdings" panose="05000000000000000000" pitchFamily="2" charset="2"/>
-              </a:rPr>
-              <a:t></a:t>
-            </a:r>
-            <a:endParaRPr lang="fr-FR" baseline="0" dirty="0" smtClean="0"/>
-          </a:p>
-        </p:txBody>
-      </p:sp>
-      <p:sp>
-        <p:nvSpPr>
-          <p:cNvPr id="4" name="Espace réservé du numéro de diapositive 3"/>
-          <p:cNvSpPr>
-            <a:spLocks noGrp="1"/>
-          </p:cNvSpPr>
-          <p:nvPr>
-            <p:ph type="sldNum" sz="quarter" idx="10"/>
-          </p:nvPr>
-        </p:nvSpPr>
-        <p:spPr/>
-        <p:txBody>
-          <a:bodyPr/>
-          <a:lstStyle/>
-          <a:p>
             <a:fld id="{5DD406B2-B765-4C86-8B2F-F7185F38B849}" type="slidenum">
               <a:rPr lang="fr-FR" smtClean="0"/>
-              <a:t>10</a:t>
+              <a:t>12</a:t>
             </a:fld>
             <a:endParaRPr lang="fr-FR"/>
           </a:p>
@@ -1996,7 +2106,7 @@
     </p:spTree>
     <p:extLst>
       <p:ext uri="{BB962C8B-B14F-4D97-AF65-F5344CB8AC3E}">
-        <p14:creationId xmlns:p14="http://schemas.microsoft.com/office/powerpoint/2010/main" val="3596911349"/>
+        <p14:creationId xmlns:p14="http://schemas.microsoft.com/office/powerpoint/2010/main" val="23500370"/>
       </p:ext>
     </p:extLst>
   </p:cSld>
@@ -2051,10 +2161,136 @@
           <a:lstStyle/>
           <a:p>
             <a:r>
+              <a:rPr lang="fr-FR" dirty="0" smtClean="0"/>
+              <a:t>Savoir le tempo nous permet de passer des secondes à</a:t>
+            </a:r>
+            <a:r>
+              <a:rPr lang="fr-FR" baseline="0" dirty="0" smtClean="0"/>
+              <a:t> la base</a:t>
+            </a:r>
+            <a:r>
+              <a:rPr lang="fr-FR" dirty="0" smtClean="0"/>
+              <a:t> « nombre de double croches ».</a:t>
+            </a:r>
+          </a:p>
+          <a:p>
+            <a:r>
+              <a:rPr lang="fr-FR" dirty="0" smtClean="0"/>
+              <a:t>On</a:t>
+            </a:r>
+            <a:r>
+              <a:rPr lang="fr-FR" baseline="0" dirty="0" smtClean="0"/>
+              <a:t> arrondie pas directement le résultat.</a:t>
+            </a:r>
+          </a:p>
+          <a:p>
+            <a:endParaRPr lang="fr-FR" baseline="0" dirty="0" smtClean="0"/>
+          </a:p>
+          <a:p>
+            <a:r>
+              <a:rPr lang="fr-FR" baseline="0" dirty="0" smtClean="0"/>
+              <a:t>Difficile de trouver la probabilité dans la littérature</a:t>
+            </a:r>
+          </a:p>
+          <a:p>
+            <a:r>
+              <a:rPr lang="fr-FR" baseline="0" dirty="0" smtClean="0"/>
+              <a:t>Nous avons ajusté les valeurs pour améliorer les résultats (empirique ou triche?) </a:t>
+            </a:r>
+            <a:r>
+              <a:rPr lang="fr-FR" baseline="0" dirty="0" smtClean="0">
+                <a:sym typeface="Wingdings" panose="05000000000000000000" pitchFamily="2" charset="2"/>
+              </a:rPr>
+              <a:t></a:t>
+            </a:r>
+            <a:endParaRPr lang="fr-FR" baseline="0" dirty="0" smtClean="0"/>
+          </a:p>
+        </p:txBody>
+      </p:sp>
+      <p:sp>
+        <p:nvSpPr>
+          <p:cNvPr id="4" name="Espace réservé du numéro de diapositive 3"/>
+          <p:cNvSpPr>
+            <a:spLocks noGrp="1"/>
+          </p:cNvSpPr>
+          <p:nvPr>
+            <p:ph type="sldNum" sz="quarter" idx="10"/>
+          </p:nvPr>
+        </p:nvSpPr>
+        <p:spPr/>
+        <p:txBody>
+          <a:bodyPr/>
+          <a:lstStyle/>
+          <a:p>
+            <a:fld id="{5DD406B2-B765-4C86-8B2F-F7185F38B849}" type="slidenum">
+              <a:rPr lang="fr-FR" smtClean="0"/>
+              <a:t>13</a:t>
+            </a:fld>
+            <a:endParaRPr lang="fr-FR"/>
+          </a:p>
+        </p:txBody>
+      </p:sp>
+    </p:spTree>
+    <p:extLst>
+      <p:ext uri="{BB962C8B-B14F-4D97-AF65-F5344CB8AC3E}">
+        <p14:creationId xmlns:p14="http://schemas.microsoft.com/office/powerpoint/2010/main" val="3596911349"/>
+      </p:ext>
+    </p:extLst>
+  </p:cSld>
+  <p:clrMapOvr>
+    <a:masterClrMapping/>
+  </p:clrMapOvr>
+</p:notes>
+</file>
+
+<file path=ppt/notesSlides/notesSlide9.xml><?xml version="1.0" encoding="utf-8"?>
+<p:notes xmlns:a="http://schemas.openxmlformats.org/drawingml/2006/main" xmlns:r="http://schemas.openxmlformats.org/officeDocument/2006/relationships" xmlns:p="http://schemas.openxmlformats.org/presentationml/2006/main">
+  <p:cSld>
+    <p:spTree>
+      <p:nvGrpSpPr>
+        <p:cNvPr id="1" name=""/>
+        <p:cNvGrpSpPr/>
+        <p:nvPr/>
+      </p:nvGrpSpPr>
+      <p:grpSpPr>
+        <a:xfrm>
+          <a:off x="0" y="0"/>
+          <a:ext cx="0" cy="0"/>
+          <a:chOff x="0" y="0"/>
+          <a:chExt cx="0" cy="0"/>
+        </a:xfrm>
+      </p:grpSpPr>
+      <p:sp>
+        <p:nvSpPr>
+          <p:cNvPr id="2" name="Espace réservé de l'image des diapositives 1"/>
+          <p:cNvSpPr>
+            <a:spLocks noGrp="1" noRot="1" noChangeAspect="1"/>
+          </p:cNvSpPr>
+          <p:nvPr>
+            <p:ph type="sldImg"/>
+          </p:nvPr>
+        </p:nvSpPr>
+        <p:spPr/>
+      </p:sp>
+      <p:sp>
+        <p:nvSpPr>
+          <p:cNvPr id="3" name="Espace réservé des commentaires 2"/>
+          <p:cNvSpPr>
+            <a:spLocks noGrp="1"/>
+          </p:cNvSpPr>
+          <p:nvPr>
+            <p:ph type="body" idx="1"/>
+          </p:nvPr>
+        </p:nvSpPr>
+        <p:spPr/>
+        <p:txBody>
+          <a:bodyPr/>
+          <a:lstStyle/>
+          <a:p>
+            <a:r>
               <a:rPr lang="fr-FR" baseline="0" dirty="0" smtClean="0"/>
               <a:t>On calcule les bords des gaussiennes par barycentre</a:t>
             </a:r>
-            <a:endParaRPr lang="fr-FR" baseline="0" dirty="0" smtClean="0"/>
           </a:p>
         </p:txBody>
       </p:sp>
@@ -2075,7 +2311,7 @@
           <a:p>
             <a:fld id="{5DD406B2-B765-4C86-8B2F-F7185F38B849}" type="slidenum">
               <a:rPr lang="fr-FR" smtClean="0"/>
-              <a:t>11</a:t>
+              <a:t>14</a:t>
             </a:fld>
             <a:endParaRPr lang="fr-FR"/>
           </a:p>
@@ -5571,6 +5807,1675 @@
           <a:lstStyle/>
           <a:p>
             <a:r>
+              <a:rPr lang="fr-FR" dirty="0"/>
+              <a:t>Estimation de tempo</a:t>
+            </a:r>
+          </a:p>
+        </p:txBody>
+      </p:sp>
+      <p:sp>
+        <p:nvSpPr>
+          <p:cNvPr id="3" name="Espace réservé du contenu 2"/>
+          <p:cNvSpPr>
+            <a:spLocks noGrp="1"/>
+          </p:cNvSpPr>
+          <p:nvPr>
+            <p:ph idx="1"/>
+          </p:nvPr>
+        </p:nvSpPr>
+        <p:spPr>
+          <a:xfrm>
+            <a:off x="239185" y="1196976"/>
+            <a:ext cx="11713633" cy="1309461"/>
+          </a:xfrm>
+        </p:spPr>
+        <p:txBody>
+          <a:bodyPr/>
+          <a:lstStyle/>
+          <a:p>
+            <a:r>
+              <a:rPr lang="fr-FR" dirty="0" smtClean="0"/>
+              <a:t>Accumulation des résultats</a:t>
+            </a:r>
+            <a:endParaRPr lang="fr-FR" dirty="0"/>
+          </a:p>
+          <a:p>
+            <a:pPr lvl="1"/>
+            <a:r>
+              <a:rPr lang="fr-FR" sz="2000" dirty="0" smtClean="0"/>
+              <a:t>On garde un tempo par fenêtre</a:t>
+            </a:r>
+          </a:p>
+          <a:p>
+            <a:pPr lvl="1"/>
+            <a:r>
+              <a:rPr lang="fr-FR" sz="2000" dirty="0" smtClean="0"/>
+              <a:t>Pour chaque fenêtre, on construit une gaussienne autour du tempo choisi.</a:t>
+            </a:r>
+          </a:p>
+          <a:p>
+            <a:pPr lvl="1"/>
+            <a:endParaRPr lang="fr-FR" dirty="0"/>
+          </a:p>
+        </p:txBody>
+      </p:sp>
+      <p:sp>
+        <p:nvSpPr>
+          <p:cNvPr id="4" name="Espace réservé du pied de page 3"/>
+          <p:cNvSpPr>
+            <a:spLocks noGrp="1"/>
+          </p:cNvSpPr>
+          <p:nvPr>
+            <p:ph type="ftr" sz="quarter" idx="10"/>
+          </p:nvPr>
+        </p:nvSpPr>
+        <p:spPr/>
+        <p:txBody>
+          <a:bodyPr/>
+          <a:lstStyle/>
+          <a:p>
+            <a:r>
+              <a:rPr lang="fr-FR" smtClean="0"/>
+              <a:t>Projet de Fin d’étude – Générateur de Partition de de Musique – R. Gallard  - M.Laurent  - L.Riobé</a:t>
+            </a:r>
+            <a:endParaRPr lang="fr-FR"/>
+          </a:p>
+        </p:txBody>
+      </p:sp>
+      <p:sp>
+        <p:nvSpPr>
+          <p:cNvPr id="5" name="Espace réservé du numéro de diapositive 4"/>
+          <p:cNvSpPr>
+            <a:spLocks noGrp="1"/>
+          </p:cNvSpPr>
+          <p:nvPr>
+            <p:ph type="sldNum" sz="quarter" idx="11"/>
+          </p:nvPr>
+        </p:nvSpPr>
+        <p:spPr/>
+        <p:txBody>
+          <a:bodyPr/>
+          <a:lstStyle/>
+          <a:p>
+            <a:fld id="{AC23D0E6-50B7-48D2-8E06-55790222EDB8}" type="slidenum">
+              <a:rPr lang="fr-FR" smtClean="0"/>
+              <a:t>10</a:t>
+            </a:fld>
+            <a:endParaRPr lang="fr-FR"/>
+          </a:p>
+        </p:txBody>
+      </p:sp>
+      <p:pic>
+        <p:nvPicPr>
+          <p:cNvPr id="6" name="Image 5"/>
+          <p:cNvPicPr/>
+          <p:nvPr/>
+        </p:nvPicPr>
+        <p:blipFill rotWithShape="1">
+          <a:blip r:embed="rId3">
+            <a:extLst>
+              <a:ext uri="{28A0092B-C50C-407E-A947-70E740481C1C}">
+                <a14:useLocalDpi xmlns:a14="http://schemas.microsoft.com/office/drawing/2010/main" val="0"/>
+              </a:ext>
+            </a:extLst>
+          </a:blip>
+          <a:srcRect l="8674" t="4378" r="6606" b="5591"/>
+          <a:stretch/>
+        </p:blipFill>
+        <p:spPr bwMode="auto">
+          <a:xfrm>
+            <a:off x="239185" y="2411728"/>
+            <a:ext cx="4879975" cy="3497580"/>
+          </a:xfrm>
+          <a:prstGeom prst="rect">
+            <a:avLst/>
+          </a:prstGeom>
+          <a:ln>
+            <a:noFill/>
+          </a:ln>
+          <a:extLst>
+            <a:ext uri="{53640926-AAD7-44D8-BBD7-CCE9431645EC}">
+              <a14:shadowObscured xmlns:a14="http://schemas.microsoft.com/office/drawing/2010/main"/>
+            </a:ext>
+          </a:extLst>
+        </p:spPr>
+      </p:pic>
+      <p:grpSp>
+        <p:nvGrpSpPr>
+          <p:cNvPr id="10" name="Groupe 9"/>
+          <p:cNvGrpSpPr/>
+          <p:nvPr/>
+        </p:nvGrpSpPr>
+        <p:grpSpPr>
+          <a:xfrm>
+            <a:off x="5270380" y="3252650"/>
+            <a:ext cx="1651241" cy="1194969"/>
+            <a:chOff x="5520268" y="3448595"/>
+            <a:chExt cx="1651241" cy="1194969"/>
+          </a:xfrm>
+        </p:grpSpPr>
+        <p:sp>
+          <p:nvSpPr>
+            <p:cNvPr id="7" name="Flèche droite 6"/>
+            <p:cNvSpPr/>
+            <p:nvPr/>
+          </p:nvSpPr>
+          <p:spPr>
+            <a:xfrm>
+              <a:off x="5927877" y="3448595"/>
+              <a:ext cx="836023" cy="548640"/>
+            </a:xfrm>
+            <a:prstGeom prst="rightArrow">
+              <a:avLst/>
+            </a:prstGeom>
+          </p:spPr>
+          <p:style>
+            <a:lnRef idx="2">
+              <a:schemeClr val="accent6">
+                <a:shade val="50000"/>
+              </a:schemeClr>
+            </a:lnRef>
+            <a:fillRef idx="1">
+              <a:schemeClr val="accent6"/>
+            </a:fillRef>
+            <a:effectRef idx="0">
+              <a:schemeClr val="accent6"/>
+            </a:effectRef>
+            <a:fontRef idx="minor">
+              <a:schemeClr val="lt1"/>
+            </a:fontRef>
+          </p:style>
+          <p:txBody>
+            <a:bodyPr rtlCol="0" anchor="ctr"/>
+            <a:lstStyle/>
+            <a:p>
+              <a:pPr algn="ctr"/>
+              <a:endParaRPr lang="fr-FR" dirty="0"/>
+            </a:p>
+          </p:txBody>
+        </p:sp>
+        <p:sp>
+          <p:nvSpPr>
+            <p:cNvPr id="8" name="ZoneTexte 7"/>
+            <p:cNvSpPr txBox="1"/>
+            <p:nvPr/>
+          </p:nvSpPr>
+          <p:spPr>
+            <a:xfrm>
+              <a:off x="5520268" y="3997233"/>
+              <a:ext cx="1651241" cy="646331"/>
+            </a:xfrm>
+            <a:prstGeom prst="rect">
+              <a:avLst/>
+            </a:prstGeom>
+            <a:noFill/>
+          </p:spPr>
+          <p:txBody>
+            <a:bodyPr wrap="square" rtlCol="0">
+              <a:spAutoFit/>
+            </a:bodyPr>
+            <a:lstStyle/>
+            <a:p>
+              <a:pPr algn="ctr"/>
+              <a:r>
+                <a:rPr lang="fr-FR" dirty="0" smtClean="0"/>
+                <a:t>Somme + normalisation</a:t>
+              </a:r>
+              <a:endParaRPr lang="fr-FR" dirty="0"/>
+            </a:p>
+          </p:txBody>
+        </p:sp>
+      </p:grpSp>
+      <p:pic>
+        <p:nvPicPr>
+          <p:cNvPr id="9" name="Image 8"/>
+          <p:cNvPicPr/>
+          <p:nvPr/>
+        </p:nvPicPr>
+        <p:blipFill rotWithShape="1">
+          <a:blip r:embed="rId4">
+            <a:extLst>
+              <a:ext uri="{28A0092B-C50C-407E-A947-70E740481C1C}">
+                <a14:useLocalDpi xmlns:a14="http://schemas.microsoft.com/office/drawing/2010/main" val="0"/>
+              </a:ext>
+            </a:extLst>
+          </a:blip>
+          <a:srcRect l="9044" r="6424"/>
+          <a:stretch/>
+        </p:blipFill>
+        <p:spPr bwMode="auto">
+          <a:xfrm>
+            <a:off x="7001690" y="2560635"/>
+            <a:ext cx="4869180" cy="2742565"/>
+          </a:xfrm>
+          <a:prstGeom prst="rect">
+            <a:avLst/>
+          </a:prstGeom>
+          <a:ln>
+            <a:noFill/>
+          </a:ln>
+          <a:extLst>
+            <a:ext uri="{53640926-AAD7-44D8-BBD7-CCE9431645EC}">
+              <a14:shadowObscured xmlns:a14="http://schemas.microsoft.com/office/drawing/2010/main"/>
+            </a:ext>
+          </a:extLst>
+        </p:spPr>
+      </p:pic>
+      <p:sp>
+        <p:nvSpPr>
+          <p:cNvPr id="11" name="Espace réservé du contenu 2"/>
+          <p:cNvSpPr txBox="1">
+            <a:spLocks/>
+          </p:cNvSpPr>
+          <p:nvPr/>
+        </p:nvSpPr>
+        <p:spPr bwMode="auto">
+          <a:xfrm>
+            <a:off x="239185" y="5930537"/>
+            <a:ext cx="11713633" cy="535715"/>
+          </a:xfrm>
+          <a:prstGeom prst="rect">
+            <a:avLst/>
+          </a:prstGeom>
+          <a:noFill/>
+          <a:ln>
+            <a:noFill/>
+          </a:ln>
+          <a:effectLst/>
+          <a:extLst>
+            <a:ext uri="{909E8E84-426E-40DD-AFC4-6F175D3DCCD1}">
+              <a14:hiddenFill xmlns:a14="http://schemas.microsoft.com/office/drawing/2010/main">
+                <a:solidFill>
+                  <a:schemeClr val="accent1"/>
+                </a:solidFill>
+              </a14:hiddenFill>
+            </a:ext>
+            <a:ext uri="{91240B29-F687-4F45-9708-019B960494DF}">
+              <a14:hiddenLine xmlns:a14="http://schemas.microsoft.com/office/drawing/2010/main" w="9525">
+                <a:solidFill>
+                  <a:schemeClr val="tx1"/>
+                </a:solidFill>
+                <a:miter lim="800000"/>
+                <a:headEnd/>
+                <a:tailEnd/>
+              </a14:hiddenLine>
+            </a:ext>
+            <a:ext uri="{AF507438-7753-43E0-B8FC-AC1667EBCBE1}">
+              <a14:hiddenEffects xmlns:a14="http://schemas.microsoft.com/office/drawing/2010/main">
+                <a:effectLst>
+                  <a:outerShdw dist="35921" dir="2700000" algn="ctr" rotWithShape="0">
+                    <a:schemeClr val="bg2"/>
+                  </a:outerShdw>
+                </a:effectLst>
+              </a14:hiddenEffects>
+            </a:ext>
+          </a:extLst>
+        </p:spPr>
+        <p:txBody>
+          <a:bodyPr vert="horz" wrap="square" lIns="91440" tIns="45720" rIns="91440" bIns="45720" numCol="1" anchor="t" anchorCtr="0" compatLnSpc="1">
+            <a:prstTxWarp prst="textNoShape">
+              <a:avLst/>
+            </a:prstTxWarp>
+          </a:bodyPr>
+          <a:lstStyle>
+            <a:lvl1pPr marL="342900" indent="-342900" algn="l" rtl="0" eaLnBrk="1" fontAlgn="base" hangingPunct="1">
+              <a:spcBef>
+                <a:spcPct val="20000"/>
+              </a:spcBef>
+              <a:spcAft>
+                <a:spcPct val="0"/>
+              </a:spcAft>
+              <a:defRPr sz="2400" b="1" kern="1200">
+                <a:solidFill>
+                  <a:schemeClr val="accent2"/>
+                </a:solidFill>
+                <a:latin typeface="+mn-lt"/>
+                <a:ea typeface="+mn-ea"/>
+                <a:cs typeface="+mn-cs"/>
+              </a:defRPr>
+            </a:lvl1pPr>
+            <a:lvl2pPr marL="742950" indent="-285750" algn="l" rtl="0" eaLnBrk="1" fontAlgn="base" hangingPunct="1">
+              <a:spcBef>
+                <a:spcPct val="20000"/>
+              </a:spcBef>
+              <a:spcAft>
+                <a:spcPct val="0"/>
+              </a:spcAft>
+              <a:defRPr sz="2400" kern="1200">
+                <a:solidFill>
+                  <a:schemeClr val="tx1"/>
+                </a:solidFill>
+                <a:latin typeface="+mn-lt"/>
+                <a:ea typeface="+mn-ea"/>
+                <a:cs typeface="+mn-cs"/>
+              </a:defRPr>
+            </a:lvl2pPr>
+            <a:lvl3pPr marL="1143000" indent="-228600" algn="l" rtl="0" eaLnBrk="1" fontAlgn="base" hangingPunct="1">
+              <a:spcBef>
+                <a:spcPct val="20000"/>
+              </a:spcBef>
+              <a:spcAft>
+                <a:spcPct val="0"/>
+              </a:spcAft>
+              <a:buChar char="•"/>
+              <a:defRPr sz="2400" kern="1200">
+                <a:solidFill>
+                  <a:schemeClr val="tx1"/>
+                </a:solidFill>
+                <a:latin typeface="+mn-lt"/>
+                <a:ea typeface="+mn-ea"/>
+                <a:cs typeface="+mn-cs"/>
+              </a:defRPr>
+            </a:lvl3pPr>
+            <a:lvl4pPr marL="1600200" indent="-228600" algn="l" rtl="0" eaLnBrk="1" fontAlgn="base" hangingPunct="1">
+              <a:spcBef>
+                <a:spcPct val="20000"/>
+              </a:spcBef>
+              <a:spcAft>
+                <a:spcPct val="0"/>
+              </a:spcAft>
+              <a:defRPr sz="2400" kern="1200">
+                <a:solidFill>
+                  <a:schemeClr val="tx1"/>
+                </a:solidFill>
+                <a:latin typeface="+mn-lt"/>
+                <a:ea typeface="+mn-ea"/>
+                <a:cs typeface="+mn-cs"/>
+              </a:defRPr>
+            </a:lvl4pPr>
+            <a:lvl5pPr marL="2057400" indent="-228600" algn="l" rtl="0" eaLnBrk="1" fontAlgn="base" hangingPunct="1">
+              <a:spcBef>
+                <a:spcPct val="20000"/>
+              </a:spcBef>
+              <a:spcAft>
+                <a:spcPct val="0"/>
+              </a:spcAft>
+              <a:buChar char="»"/>
+              <a:defRPr sz="2400" kern="1200">
+                <a:solidFill>
+                  <a:schemeClr val="tx1"/>
+                </a:solidFill>
+                <a:latin typeface="+mn-lt"/>
+                <a:ea typeface="+mn-ea"/>
+                <a:cs typeface="+mn-cs"/>
+              </a:defRPr>
+            </a:lvl5pPr>
+            <a:lvl6pPr marL="2514600" indent="-228600" algn="l" defTabSz="914400" rtl="0" eaLnBrk="1" latinLnBrk="0" hangingPunct="1">
+              <a:lnSpc>
+                <a:spcPct val="90000"/>
+              </a:lnSpc>
+              <a:spcBef>
+                <a:spcPts val="500"/>
+              </a:spcBef>
+              <a:buFont typeface="Arial" panose="020B0604020202020204" pitchFamily="34" charset="0"/>
+              <a:buChar char="•"/>
+              <a:defRPr sz="1800" kern="1200">
+                <a:solidFill>
+                  <a:schemeClr val="tx1"/>
+                </a:solidFill>
+                <a:latin typeface="+mn-lt"/>
+                <a:ea typeface="+mn-ea"/>
+                <a:cs typeface="+mn-cs"/>
+              </a:defRPr>
+            </a:lvl6pPr>
+            <a:lvl7pPr marL="2971800" indent="-228600" algn="l" defTabSz="914400" rtl="0" eaLnBrk="1" latinLnBrk="0" hangingPunct="1">
+              <a:lnSpc>
+                <a:spcPct val="90000"/>
+              </a:lnSpc>
+              <a:spcBef>
+                <a:spcPts val="500"/>
+              </a:spcBef>
+              <a:buFont typeface="Arial" panose="020B0604020202020204" pitchFamily="34" charset="0"/>
+              <a:buChar char="•"/>
+              <a:defRPr sz="1800" kern="1200">
+                <a:solidFill>
+                  <a:schemeClr val="tx1"/>
+                </a:solidFill>
+                <a:latin typeface="+mn-lt"/>
+                <a:ea typeface="+mn-ea"/>
+                <a:cs typeface="+mn-cs"/>
+              </a:defRPr>
+            </a:lvl7pPr>
+            <a:lvl8pPr marL="3429000" indent="-228600" algn="l" defTabSz="914400" rtl="0" eaLnBrk="1" latinLnBrk="0" hangingPunct="1">
+              <a:lnSpc>
+                <a:spcPct val="90000"/>
+              </a:lnSpc>
+              <a:spcBef>
+                <a:spcPts val="500"/>
+              </a:spcBef>
+              <a:buFont typeface="Arial" panose="020B0604020202020204" pitchFamily="34" charset="0"/>
+              <a:buChar char="•"/>
+              <a:defRPr sz="1800" kern="1200">
+                <a:solidFill>
+                  <a:schemeClr val="tx1"/>
+                </a:solidFill>
+                <a:latin typeface="+mn-lt"/>
+                <a:ea typeface="+mn-ea"/>
+                <a:cs typeface="+mn-cs"/>
+              </a:defRPr>
+            </a:lvl8pPr>
+            <a:lvl9pPr marL="3886200" indent="-228600" algn="l" defTabSz="914400" rtl="0" eaLnBrk="1" latinLnBrk="0" hangingPunct="1">
+              <a:lnSpc>
+                <a:spcPct val="90000"/>
+              </a:lnSpc>
+              <a:spcBef>
+                <a:spcPts val="500"/>
+              </a:spcBef>
+              <a:buFont typeface="Arial" panose="020B0604020202020204" pitchFamily="34" charset="0"/>
+              <a:buChar char="•"/>
+              <a:defRPr sz="1800" kern="1200">
+                <a:solidFill>
+                  <a:schemeClr val="tx1"/>
+                </a:solidFill>
+                <a:latin typeface="+mn-lt"/>
+                <a:ea typeface="+mn-ea"/>
+                <a:cs typeface="+mn-cs"/>
+              </a:defRPr>
+            </a:lvl9pPr>
+          </a:lstStyle>
+          <a:p>
+            <a:r>
+              <a:rPr lang="fr-FR" sz="1400" dirty="0" smtClean="0"/>
+              <a:t>G. </a:t>
+            </a:r>
+            <a:r>
+              <a:rPr lang="fr-FR" sz="1400" dirty="0" err="1" smtClean="0"/>
+              <a:t>Percival</a:t>
+            </a:r>
+            <a:r>
+              <a:rPr lang="fr-FR" sz="1400" dirty="0" smtClean="0"/>
+              <a:t>, G </a:t>
+            </a:r>
+            <a:r>
+              <a:rPr lang="fr-FR" sz="1400" dirty="0" err="1" smtClean="0"/>
+              <a:t>Tzanetakis</a:t>
+            </a:r>
+            <a:r>
+              <a:rPr lang="fr-FR" sz="1400" dirty="0" smtClean="0"/>
+              <a:t>, « </a:t>
+            </a:r>
+            <a:r>
+              <a:rPr lang="en-US" sz="1400" dirty="0" smtClean="0"/>
+              <a:t>Streamlined Tempo Estimation Based on Autocorrelation and Cross-correlation With Pulses</a:t>
+            </a:r>
+            <a:r>
+              <a:rPr lang="fr-FR" sz="1400" dirty="0" smtClean="0"/>
+              <a:t> », </a:t>
+            </a:r>
+            <a:r>
+              <a:rPr lang="en-US" sz="1400" i="1" dirty="0" smtClean="0"/>
+              <a:t>﻿IEEE/ACM TRANSACTIONS ON AUDIO, SPEECH, AND LANGUAGE PROCESSING</a:t>
+            </a:r>
+            <a:r>
+              <a:rPr lang="fr-FR" sz="1400" dirty="0" smtClean="0"/>
+              <a:t>, 2014</a:t>
+            </a:r>
+            <a:endParaRPr lang="fr-FR" sz="1400" i="1" dirty="0"/>
+          </a:p>
+        </p:txBody>
+      </p:sp>
+    </p:spTree>
+    <p:extLst>
+      <p:ext uri="{BB962C8B-B14F-4D97-AF65-F5344CB8AC3E}">
+        <p14:creationId xmlns:p14="http://schemas.microsoft.com/office/powerpoint/2010/main" val="2858421720"/>
+      </p:ext>
+    </p:extLst>
+  </p:cSld>
+  <p:clrMapOvr>
+    <a:masterClrMapping/>
+  </p:clrMapOvr>
+</p:sld>
+</file>
+
+<file path=ppt/slides/slide11.xml><?xml version="1.0" encoding="utf-8"?>
+<p:sld xmlns:a="http://schemas.openxmlformats.org/drawingml/2006/main" xmlns:r="http://schemas.openxmlformats.org/officeDocument/2006/relationships" xmlns:p="http://schemas.openxmlformats.org/presentationml/2006/main">
+  <p:cSld>
+    <p:spTree>
+      <p:nvGrpSpPr>
+        <p:cNvPr id="1" name=""/>
+        <p:cNvGrpSpPr/>
+        <p:nvPr/>
+      </p:nvGrpSpPr>
+      <p:grpSpPr>
+        <a:xfrm>
+          <a:off x="0" y="0"/>
+          <a:ext cx="0" cy="0"/>
+          <a:chOff x="0" y="0"/>
+          <a:chExt cx="0" cy="0"/>
+        </a:xfrm>
+      </p:grpSpPr>
+      <p:sp>
+        <p:nvSpPr>
+          <p:cNvPr id="2" name="Titre 1"/>
+          <p:cNvSpPr>
+            <a:spLocks noGrp="1"/>
+          </p:cNvSpPr>
+          <p:nvPr>
+            <p:ph type="title"/>
+          </p:nvPr>
+        </p:nvSpPr>
+        <p:spPr/>
+        <p:txBody>
+          <a:bodyPr/>
+          <a:lstStyle/>
+          <a:p>
+            <a:r>
+              <a:rPr lang="fr-FR" dirty="0"/>
+              <a:t>Estimation de tempo</a:t>
+            </a:r>
+          </a:p>
+        </p:txBody>
+      </p:sp>
+      <p:sp>
+        <p:nvSpPr>
+          <p:cNvPr id="4" name="Espace réservé du pied de page 3"/>
+          <p:cNvSpPr>
+            <a:spLocks noGrp="1"/>
+          </p:cNvSpPr>
+          <p:nvPr>
+            <p:ph type="ftr" sz="quarter" idx="10"/>
+          </p:nvPr>
+        </p:nvSpPr>
+        <p:spPr/>
+        <p:txBody>
+          <a:bodyPr/>
+          <a:lstStyle/>
+          <a:p>
+            <a:r>
+              <a:rPr lang="fr-FR" smtClean="0"/>
+              <a:t>Projet de Fin d’étude – Générateur de Partition de de Musique – R. Gallard  - M.Laurent  - L.Riobé</a:t>
+            </a:r>
+            <a:endParaRPr lang="fr-FR"/>
+          </a:p>
+        </p:txBody>
+      </p:sp>
+      <p:sp>
+        <p:nvSpPr>
+          <p:cNvPr id="5" name="Espace réservé du numéro de diapositive 4"/>
+          <p:cNvSpPr>
+            <a:spLocks noGrp="1"/>
+          </p:cNvSpPr>
+          <p:nvPr>
+            <p:ph type="sldNum" sz="quarter" idx="11"/>
+          </p:nvPr>
+        </p:nvSpPr>
+        <p:spPr/>
+        <p:txBody>
+          <a:bodyPr/>
+          <a:lstStyle/>
+          <a:p>
+            <a:fld id="{AC23D0E6-50B7-48D2-8E06-55790222EDB8}" type="slidenum">
+              <a:rPr lang="fr-FR" smtClean="0"/>
+              <a:t>11</a:t>
+            </a:fld>
+            <a:endParaRPr lang="fr-FR"/>
+          </a:p>
+        </p:txBody>
+      </p:sp>
+      <mc:AlternateContent xmlns:mc="http://schemas.openxmlformats.org/markup-compatibility/2006" xmlns:a14="http://schemas.microsoft.com/office/drawing/2010/main">
+        <mc:Choice Requires="a14">
+          <p:sp>
+            <p:nvSpPr>
+              <p:cNvPr id="12" name="Espace réservé du contenu 11"/>
+              <p:cNvSpPr>
+                <a:spLocks noGrp="1"/>
+              </p:cNvSpPr>
+              <p:nvPr>
+                <p:ph idx="1"/>
+              </p:nvPr>
+            </p:nvSpPr>
+            <p:spPr>
+              <a:xfrm>
+                <a:off x="239185" y="1196976"/>
+                <a:ext cx="11713633" cy="2565127"/>
+              </a:xfrm>
+            </p:spPr>
+            <p:txBody>
+              <a:bodyPr/>
+              <a:lstStyle/>
+              <a:p>
+                <a:r>
+                  <a:rPr lang="fr-FR" dirty="0" smtClean="0"/>
+                  <a:t>Choix du tempo général</a:t>
+                </a:r>
+              </a:p>
+              <a:p>
+                <a:pPr marL="800100" lvl="1" indent="-342900">
+                  <a:buFont typeface="Arial" panose="020B0604020202020204" pitchFamily="34" charset="0"/>
+                  <a:buChar char="•"/>
+                </a:pPr>
+                <a:r>
+                  <a:rPr lang="fr-FR" dirty="0" smtClean="0"/>
+                  <a:t>Extraction de tous les pics en tant que tempos candidats</a:t>
+                </a:r>
+              </a:p>
+              <a:p>
+                <a:pPr marL="800100" lvl="1" indent="-342900">
+                  <a:buFont typeface="Arial" panose="020B0604020202020204" pitchFamily="34" charset="0"/>
+                  <a:buChar char="•"/>
+                </a:pPr>
+                <a:r>
+                  <a:rPr lang="fr-FR" dirty="0" smtClean="0"/>
+                  <a:t>Utilisation de l’algorithme d’analyse rythmique qui attribue un taux de confiance pour la durée de chaque note: </a:t>
+                </a:r>
+                <a14:m>
+                  <m:oMath xmlns:m="http://schemas.openxmlformats.org/officeDocument/2006/math">
+                    <m:r>
+                      <a:rPr lang="fr-FR" i="1">
+                        <a:latin typeface="Cambria Math" panose="02040503050406030204" pitchFamily="18" charset="0"/>
+                      </a:rPr>
+                      <m:t>𝜇</m:t>
+                    </m:r>
+                    <m:r>
+                      <a:rPr lang="fr-FR" i="1">
+                        <a:latin typeface="Cambria Math" panose="02040503050406030204" pitchFamily="18" charset="0"/>
+                      </a:rPr>
+                      <m:t>(</m:t>
+                    </m:r>
+                    <m:r>
+                      <a:rPr lang="fr-FR" i="1">
+                        <a:latin typeface="Cambria Math" panose="02040503050406030204" pitchFamily="18" charset="0"/>
+                      </a:rPr>
+                      <m:t>𝜏</m:t>
+                    </m:r>
+                    <m:r>
+                      <a:rPr lang="fr-FR" i="1">
+                        <a:latin typeface="Cambria Math" panose="02040503050406030204" pitchFamily="18" charset="0"/>
+                      </a:rPr>
+                      <m:t>)=</m:t>
+                    </m:r>
+                    <m:f>
+                      <m:fPr>
+                        <m:ctrlPr>
+                          <a:rPr lang="fr-FR" i="1">
+                            <a:latin typeface="Cambria Math" panose="02040503050406030204" pitchFamily="18" charset="0"/>
+                          </a:rPr>
+                        </m:ctrlPr>
+                      </m:fPr>
+                      <m:num>
+                        <m:r>
+                          <a:rPr lang="fr-FR" i="1">
+                            <a:latin typeface="Cambria Math" panose="02040503050406030204" pitchFamily="18" charset="0"/>
+                          </a:rPr>
+                          <m:t>1</m:t>
+                        </m:r>
+                      </m:num>
+                      <m:den>
+                        <m:r>
+                          <a:rPr lang="fr-FR" i="1">
+                            <a:latin typeface="Cambria Math" panose="02040503050406030204" pitchFamily="18" charset="0"/>
+                          </a:rPr>
+                          <m:t>𝑁</m:t>
+                        </m:r>
+                      </m:den>
+                    </m:f>
+                    <m:nary>
+                      <m:naryPr>
+                        <m:chr m:val="∑"/>
+                        <m:limLoc m:val="undOvr"/>
+                        <m:ctrlPr>
+                          <a:rPr lang="fr-FR" i="1">
+                            <a:latin typeface="Cambria Math" panose="02040503050406030204" pitchFamily="18" charset="0"/>
+                          </a:rPr>
+                        </m:ctrlPr>
+                      </m:naryPr>
+                      <m:sub>
+                        <m:r>
+                          <a:rPr lang="fr-FR" i="1">
+                            <a:latin typeface="Cambria Math" panose="02040503050406030204" pitchFamily="18" charset="0"/>
+                          </a:rPr>
+                          <m:t>𝑛</m:t>
+                        </m:r>
+                        <m:r>
+                          <a:rPr lang="fr-FR" i="1">
+                            <a:latin typeface="Cambria Math" panose="02040503050406030204" pitchFamily="18" charset="0"/>
+                          </a:rPr>
+                          <m:t>=1</m:t>
+                        </m:r>
+                      </m:sub>
+                      <m:sup>
+                        <m:r>
+                          <a:rPr lang="fr-FR" i="1">
+                            <a:latin typeface="Cambria Math" panose="02040503050406030204" pitchFamily="18" charset="0"/>
+                          </a:rPr>
+                          <m:t>𝑁</m:t>
+                        </m:r>
+                      </m:sup>
+                      <m:e>
+                        <m:r>
+                          <a:rPr lang="fr-FR" i="1">
+                            <a:latin typeface="Cambria Math" panose="02040503050406030204" pitchFamily="18" charset="0"/>
+                          </a:rPr>
+                          <m:t>𝑝</m:t>
+                        </m:r>
+                        <m:r>
+                          <a:rPr lang="fr-FR" i="1">
+                            <a:latin typeface="Cambria Math" panose="02040503050406030204" pitchFamily="18" charset="0"/>
+                          </a:rPr>
+                          <m:t>(</m:t>
+                        </m:r>
+                        <m:r>
+                          <a:rPr lang="fr-FR" i="1">
+                            <a:latin typeface="Cambria Math" panose="02040503050406030204" pitchFamily="18" charset="0"/>
+                          </a:rPr>
+                          <m:t>𝑛</m:t>
+                        </m:r>
+                        <m:r>
+                          <a:rPr lang="fr-FR" i="1">
+                            <a:latin typeface="Cambria Math" panose="02040503050406030204" pitchFamily="18" charset="0"/>
+                          </a:rPr>
+                          <m:t>|</m:t>
+                        </m:r>
+                        <m:r>
+                          <a:rPr lang="fr-FR" i="1">
+                            <a:latin typeface="Cambria Math" panose="02040503050406030204" pitchFamily="18" charset="0"/>
+                          </a:rPr>
+                          <m:t>𝜏</m:t>
+                        </m:r>
+                        <m:r>
+                          <a:rPr lang="fr-FR" i="1">
+                            <a:latin typeface="Cambria Math" panose="02040503050406030204" pitchFamily="18" charset="0"/>
+                          </a:rPr>
+                          <m:t>)</m:t>
+                        </m:r>
+                      </m:e>
+                    </m:nary>
+                  </m:oMath>
+                </a14:m>
+                <a:endParaRPr lang="fr-FR" dirty="0" smtClean="0"/>
+              </a:p>
+              <a:p>
+                <a:pPr marL="800100" lvl="1" indent="-342900">
+                  <a:buFont typeface="Arial" panose="020B0604020202020204" pitchFamily="34" charset="0"/>
+                  <a:buChar char="•"/>
+                </a:pPr>
+                <a:r>
+                  <a:rPr lang="fr-FR" dirty="0" smtClean="0"/>
+                  <a:t>Prise en compte de la fréquence d’apparition de chaque durées</a:t>
+                </a:r>
+                <a:endParaRPr lang="fr-FR" dirty="0"/>
+              </a:p>
+              <a:p>
+                <a:pPr marL="800100" lvl="1" indent="-342900">
+                  <a:buFont typeface="Arial" panose="020B0604020202020204" pitchFamily="34" charset="0"/>
+                  <a:buChar char="•"/>
+                </a:pPr>
+                <a:endParaRPr lang="fr-FR" dirty="0" smtClean="0"/>
+              </a:p>
+            </p:txBody>
+          </p:sp>
+        </mc:Choice>
+        <mc:Fallback xmlns="">
+          <p:sp>
+            <p:nvSpPr>
+              <p:cNvPr id="12" name="Espace réservé du contenu 11"/>
+              <p:cNvSpPr>
+                <a:spLocks noGrp="1" noRot="1" noChangeAspect="1" noMove="1" noResize="1" noEditPoints="1" noAdjustHandles="1" noChangeArrowheads="1" noChangeShapeType="1" noTextEdit="1"/>
+              </p:cNvSpPr>
+              <p:nvPr>
+                <p:ph idx="1"/>
+              </p:nvPr>
+            </p:nvSpPr>
+            <p:spPr>
+              <a:xfrm>
+                <a:off x="239185" y="1196976"/>
+                <a:ext cx="11713633" cy="2565127"/>
+              </a:xfrm>
+              <a:blipFill rotWithShape="0">
+                <a:blip r:embed="rId3"/>
+                <a:stretch>
+                  <a:fillRect l="-780" t="-1663" r="-1145"/>
+                </a:stretch>
+              </a:blipFill>
+            </p:spPr>
+            <p:txBody>
+              <a:bodyPr/>
+              <a:lstStyle/>
+              <a:p>
+                <a:r>
+                  <a:rPr lang="fr-FR">
+                    <a:noFill/>
+                  </a:rPr>
+                  <a:t> </a:t>
+                </a:r>
+              </a:p>
+            </p:txBody>
+          </p:sp>
+        </mc:Fallback>
+      </mc:AlternateContent>
+      <p:sp>
+        <p:nvSpPr>
+          <p:cNvPr id="13" name="ZoneTexte 12"/>
+          <p:cNvSpPr txBox="1"/>
+          <p:nvPr/>
+        </p:nvSpPr>
+        <p:spPr>
+          <a:xfrm>
+            <a:off x="2804160" y="4472298"/>
+            <a:ext cx="6583680" cy="461665"/>
+          </a:xfrm>
+          <a:prstGeom prst="rect">
+            <a:avLst/>
+          </a:prstGeom>
+          <a:noFill/>
+          <a:ln>
+            <a:noFill/>
+          </a:ln>
+          <a:effectLst/>
+          <a:extLst>
+            <a:ext uri="{909E8E84-426E-40DD-AFC4-6F175D3DCCD1}">
+              <a14:hiddenFill xmlns:a14="http://schemas.microsoft.com/office/drawing/2010/main">
+                <a:solidFill>
+                  <a:schemeClr val="accent1"/>
+                </a:solidFill>
+              </a14:hiddenFill>
+            </a:ext>
+            <a:ext uri="{91240B29-F687-4F45-9708-019B960494DF}">
+              <a14:hiddenLine xmlns:a14="http://schemas.microsoft.com/office/drawing/2010/main" w="9525">
+                <a:solidFill>
+                  <a:schemeClr val="tx1"/>
+                </a:solidFill>
+                <a:miter lim="800000"/>
+                <a:headEnd/>
+                <a:tailEnd/>
+              </a14:hiddenLine>
+            </a:ext>
+            <a:ext uri="{AF507438-7753-43E0-B8FC-AC1667EBCBE1}">
+              <a14:hiddenEffects xmlns:a14="http://schemas.microsoft.com/office/drawing/2010/main">
+                <a:effectLst>
+                  <a:outerShdw dist="35921" dir="2700000" algn="ctr" rotWithShape="0">
+                    <a:schemeClr val="bg2"/>
+                  </a:outerShdw>
+                </a:effectLst>
+              </a14:hiddenEffects>
+            </a:ext>
+          </a:extLst>
+        </p:spPr>
+        <p:txBody>
+          <a:bodyPr vert="horz" wrap="square" lIns="91440" tIns="45720" rIns="91440" bIns="45720" numCol="1" anchor="t" anchorCtr="0" compatLnSpc="1">
+            <a:prstTxWarp prst="textNoShape">
+              <a:avLst/>
+            </a:prstTxWarp>
+          </a:bodyPr>
+          <a:lstStyle>
+            <a:lvl1pPr marL="342900" indent="-342900" fontAlgn="base">
+              <a:spcBef>
+                <a:spcPct val="20000"/>
+              </a:spcBef>
+              <a:spcAft>
+                <a:spcPct val="0"/>
+              </a:spcAft>
+              <a:defRPr sz="2400" b="1">
+                <a:solidFill>
+                  <a:schemeClr val="accent2"/>
+                </a:solidFill>
+              </a:defRPr>
+            </a:lvl1pPr>
+            <a:lvl2pPr marL="800100" lvl="1" indent="-342900" fontAlgn="base">
+              <a:spcBef>
+                <a:spcPct val="20000"/>
+              </a:spcBef>
+              <a:spcAft>
+                <a:spcPct val="0"/>
+              </a:spcAft>
+              <a:buFont typeface="Arial" panose="020B0604020202020204" pitchFamily="34" charset="0"/>
+              <a:buChar char="•"/>
+              <a:defRPr sz="2400"/>
+            </a:lvl2pPr>
+            <a:lvl3pPr marL="1143000" indent="-228600" fontAlgn="base">
+              <a:spcBef>
+                <a:spcPct val="20000"/>
+              </a:spcBef>
+              <a:spcAft>
+                <a:spcPct val="0"/>
+              </a:spcAft>
+              <a:buChar char="•"/>
+              <a:defRPr sz="2400"/>
+            </a:lvl3pPr>
+            <a:lvl4pPr marL="1600200" indent="-228600" fontAlgn="base">
+              <a:spcBef>
+                <a:spcPct val="20000"/>
+              </a:spcBef>
+              <a:spcAft>
+                <a:spcPct val="0"/>
+              </a:spcAft>
+              <a:defRPr sz="2400"/>
+            </a:lvl4pPr>
+            <a:lvl5pPr marL="2057400" indent="-228600" fontAlgn="base">
+              <a:spcBef>
+                <a:spcPct val="20000"/>
+              </a:spcBef>
+              <a:spcAft>
+                <a:spcPct val="0"/>
+              </a:spcAft>
+              <a:buChar char="»"/>
+              <a:defRPr sz="2400"/>
+            </a:lvl5pPr>
+            <a:lvl6pPr marL="2514600" indent="-228600">
+              <a:lnSpc>
+                <a:spcPct val="90000"/>
+              </a:lnSpc>
+              <a:spcBef>
+                <a:spcPts val="500"/>
+              </a:spcBef>
+              <a:buFont typeface="Arial" panose="020B0604020202020204" pitchFamily="34" charset="0"/>
+              <a:buChar char="•"/>
+            </a:lvl6pPr>
+            <a:lvl7pPr marL="2971800" indent="-228600">
+              <a:lnSpc>
+                <a:spcPct val="90000"/>
+              </a:lnSpc>
+              <a:spcBef>
+                <a:spcPts val="500"/>
+              </a:spcBef>
+              <a:buFont typeface="Arial" panose="020B0604020202020204" pitchFamily="34" charset="0"/>
+              <a:buChar char="•"/>
+            </a:lvl7pPr>
+            <a:lvl8pPr marL="3429000" indent="-228600">
+              <a:lnSpc>
+                <a:spcPct val="90000"/>
+              </a:lnSpc>
+              <a:spcBef>
+                <a:spcPts val="500"/>
+              </a:spcBef>
+              <a:buFont typeface="Arial" panose="020B0604020202020204" pitchFamily="34" charset="0"/>
+              <a:buChar char="•"/>
+            </a:lvl8pPr>
+            <a:lvl9pPr marL="3886200" indent="-228600">
+              <a:lnSpc>
+                <a:spcPct val="90000"/>
+              </a:lnSpc>
+              <a:spcBef>
+                <a:spcPts val="500"/>
+              </a:spcBef>
+              <a:buFont typeface="Arial" panose="020B0604020202020204" pitchFamily="34" charset="0"/>
+              <a:buChar char="•"/>
+            </a:lvl9pPr>
+          </a:lstStyle>
+          <a:p>
+            <a:pPr algn="ctr"/>
+            <a:r>
+              <a:rPr lang="fr-FR" dirty="0" smtClean="0"/>
+              <a:t>Choix du tempo</a:t>
+            </a:r>
+            <a:endParaRPr lang="fr-FR" dirty="0"/>
+          </a:p>
+        </p:txBody>
+      </p:sp>
+      <p:sp>
+        <p:nvSpPr>
+          <p:cNvPr id="14" name="Flèche droite 13"/>
+          <p:cNvSpPr/>
+          <p:nvPr/>
+        </p:nvSpPr>
+        <p:spPr>
+          <a:xfrm rot="5400000">
+            <a:off x="5560422" y="3714252"/>
+            <a:ext cx="836023" cy="548640"/>
+          </a:xfrm>
+          <a:prstGeom prst="rightArrow">
+            <a:avLst/>
+          </a:prstGeom>
+        </p:spPr>
+        <p:style>
+          <a:lnRef idx="2">
+            <a:schemeClr val="accent6">
+              <a:shade val="50000"/>
+            </a:schemeClr>
+          </a:lnRef>
+          <a:fillRef idx="1">
+            <a:schemeClr val="accent6"/>
+          </a:fillRef>
+          <a:effectRef idx="0">
+            <a:schemeClr val="accent6"/>
+          </a:effectRef>
+          <a:fontRef idx="minor">
+            <a:schemeClr val="lt1"/>
+          </a:fontRef>
+        </p:style>
+        <p:txBody>
+          <a:bodyPr rtlCol="0" anchor="ctr"/>
+          <a:lstStyle/>
+          <a:p>
+            <a:pPr algn="ctr"/>
+            <a:endParaRPr lang="fr-FR" dirty="0"/>
+          </a:p>
+        </p:txBody>
+      </p:sp>
+      <p:sp>
+        <p:nvSpPr>
+          <p:cNvPr id="15" name="ZoneTexte 14"/>
+          <p:cNvSpPr txBox="1"/>
+          <p:nvPr/>
+        </p:nvSpPr>
+        <p:spPr>
+          <a:xfrm>
+            <a:off x="1423187" y="5395628"/>
+            <a:ext cx="9953897" cy="646331"/>
+          </a:xfrm>
+          <a:prstGeom prst="rect">
+            <a:avLst/>
+          </a:prstGeom>
+          <a:noFill/>
+        </p:spPr>
+        <p:txBody>
+          <a:bodyPr wrap="square" rtlCol="0">
+            <a:spAutoFit/>
+          </a:bodyPr>
+          <a:lstStyle/>
+          <a:p>
+            <a:r>
+              <a:rPr lang="fr-FR" dirty="0" smtClean="0"/>
+              <a:t>Le tempo est un critère de notation subjectif qui peut dépendre d’un choix personnel de la personne qui écrit la partition (tempo à la noire, à la croche, etc…)</a:t>
+            </a:r>
+            <a:endParaRPr lang="fr-FR" dirty="0"/>
+          </a:p>
+        </p:txBody>
+      </p:sp>
+    </p:spTree>
+    <p:extLst>
+      <p:ext uri="{BB962C8B-B14F-4D97-AF65-F5344CB8AC3E}">
+        <p14:creationId xmlns:p14="http://schemas.microsoft.com/office/powerpoint/2010/main" val="3752303451"/>
+      </p:ext>
+    </p:extLst>
+  </p:cSld>
+  <p:clrMapOvr>
+    <a:masterClrMapping/>
+  </p:clrMapOvr>
+</p:sld>
+</file>
+
+<file path=ppt/slides/slide12.xml><?xml version="1.0" encoding="utf-8"?>
+<p:sld xmlns:a="http://schemas.openxmlformats.org/drawingml/2006/main" xmlns:r="http://schemas.openxmlformats.org/officeDocument/2006/relationships" xmlns:p="http://schemas.openxmlformats.org/presentationml/2006/main">
+  <p:cSld>
+    <p:spTree>
+      <p:nvGrpSpPr>
+        <p:cNvPr id="1" name=""/>
+        <p:cNvGrpSpPr/>
+        <p:nvPr/>
+      </p:nvGrpSpPr>
+      <p:grpSpPr>
+        <a:xfrm>
+          <a:off x="0" y="0"/>
+          <a:ext cx="0" cy="0"/>
+          <a:chOff x="0" y="0"/>
+          <a:chExt cx="0" cy="0"/>
+        </a:xfrm>
+      </p:grpSpPr>
+      <p:sp>
+        <p:nvSpPr>
+          <p:cNvPr id="2" name="Titre 1"/>
+          <p:cNvSpPr>
+            <a:spLocks noGrp="1"/>
+          </p:cNvSpPr>
+          <p:nvPr>
+            <p:ph type="title"/>
+          </p:nvPr>
+        </p:nvSpPr>
+        <p:spPr/>
+        <p:txBody>
+          <a:bodyPr/>
+          <a:lstStyle/>
+          <a:p>
+            <a:r>
+              <a:rPr lang="fr-FR" dirty="0" smtClean="0"/>
+              <a:t>Évolution de l’estimation de tempo</a:t>
+            </a:r>
+            <a:endParaRPr lang="fr-FR" dirty="0"/>
+          </a:p>
+        </p:txBody>
+      </p:sp>
+      <p:sp>
+        <p:nvSpPr>
+          <p:cNvPr id="4" name="Espace réservé du pied de page 3"/>
+          <p:cNvSpPr>
+            <a:spLocks noGrp="1"/>
+          </p:cNvSpPr>
+          <p:nvPr>
+            <p:ph type="ftr" sz="quarter" idx="10"/>
+          </p:nvPr>
+        </p:nvSpPr>
+        <p:spPr/>
+        <p:txBody>
+          <a:bodyPr/>
+          <a:lstStyle/>
+          <a:p>
+            <a:r>
+              <a:rPr lang="fr-FR" smtClean="0"/>
+              <a:t>Projet de Fin d’étude – Générateur de Partition de de Musique – R. Gallard  - M.Laurent  - L.Riobé</a:t>
+            </a:r>
+            <a:endParaRPr lang="fr-FR"/>
+          </a:p>
+        </p:txBody>
+      </p:sp>
+      <p:sp>
+        <p:nvSpPr>
+          <p:cNvPr id="5" name="Espace réservé du numéro de diapositive 4"/>
+          <p:cNvSpPr>
+            <a:spLocks noGrp="1"/>
+          </p:cNvSpPr>
+          <p:nvPr>
+            <p:ph type="sldNum" sz="quarter" idx="11"/>
+          </p:nvPr>
+        </p:nvSpPr>
+        <p:spPr/>
+        <p:txBody>
+          <a:bodyPr/>
+          <a:lstStyle/>
+          <a:p>
+            <a:fld id="{AC23D0E6-50B7-48D2-8E06-55790222EDB8}" type="slidenum">
+              <a:rPr lang="fr-FR" smtClean="0"/>
+              <a:t>12</a:t>
+            </a:fld>
+            <a:endParaRPr lang="fr-FR"/>
+          </a:p>
+        </p:txBody>
+      </p:sp>
+      <mc:AlternateContent xmlns:mc="http://schemas.openxmlformats.org/markup-compatibility/2006">
+        <mc:Choice xmlns:a14="http://schemas.microsoft.com/office/drawing/2010/main" Requires="a14">
+          <p:sp>
+            <p:nvSpPr>
+              <p:cNvPr id="7" name="ZoneTexte 6"/>
+              <p:cNvSpPr txBox="1"/>
+              <p:nvPr/>
+            </p:nvSpPr>
+            <p:spPr>
+              <a:xfrm>
+                <a:off x="7692648" y="3812789"/>
+                <a:ext cx="4050861" cy="1138004"/>
+              </a:xfrm>
+              <a:prstGeom prst="rect">
+                <a:avLst/>
+              </a:prstGeom>
+              <a:noFill/>
+            </p:spPr>
+            <p:txBody>
+              <a:bodyPr wrap="square" rtlCol="0">
+                <a:spAutoFit/>
+              </a:bodyPr>
+              <a:lstStyle/>
+              <a:p>
+                <a:r>
+                  <a:rPr lang="fr-FR" sz="1600" smtClean="0"/>
+                  <a:t>Indicateur:</a:t>
+                </a:r>
+              </a:p>
+              <a:p>
+                <a:endParaRPr lang="fr-FR" sz="1600" dirty="0" smtClean="0"/>
+              </a:p>
+              <a:p>
+                <a14:m>
+                  <m:oMathPara xmlns:m="http://schemas.openxmlformats.org/officeDocument/2006/math">
+                    <m:oMathParaPr>
+                      <m:jc m:val="centerGroup"/>
+                    </m:oMathParaPr>
+                    <m:oMath xmlns:m="http://schemas.openxmlformats.org/officeDocument/2006/math">
+                      <m:d>
+                        <m:dPr>
+                          <m:begChr m:val="|"/>
+                          <m:endChr m:val="|"/>
+                          <m:ctrlPr>
+                            <a:rPr lang="fr-FR" sz="1600" i="1">
+                              <a:latin typeface="Cambria Math" panose="02040503050406030204" pitchFamily="18" charset="0"/>
+                            </a:rPr>
+                          </m:ctrlPr>
+                        </m:dPr>
+                        <m:e>
+                          <m:sSub>
+                            <m:sSubPr>
+                              <m:ctrlPr>
+                                <a:rPr lang="fr-FR" sz="1600" i="1">
+                                  <a:latin typeface="Cambria Math" panose="02040503050406030204" pitchFamily="18" charset="0"/>
+                                </a:rPr>
+                              </m:ctrlPr>
+                            </m:sSubPr>
+                            <m:e>
+                              <m:r>
+                                <a:rPr lang="fr-FR" sz="1600" i="1">
+                                  <a:latin typeface="Cambria Math" panose="02040503050406030204" pitchFamily="18" charset="0"/>
+                                </a:rPr>
+                                <m:t>𝑙𝑜𝑔</m:t>
+                              </m:r>
+                            </m:e>
+                            <m:sub>
+                              <m:r>
+                                <a:rPr lang="fr-FR" sz="1600" i="1">
+                                  <a:latin typeface="Cambria Math" panose="02040503050406030204" pitchFamily="18" charset="0"/>
+                                </a:rPr>
+                                <m:t>2</m:t>
+                              </m:r>
+                            </m:sub>
+                          </m:sSub>
+                          <m:d>
+                            <m:dPr>
+                              <m:ctrlPr>
+                                <a:rPr lang="fr-FR" sz="1600" i="1">
+                                  <a:latin typeface="Cambria Math" panose="02040503050406030204" pitchFamily="18" charset="0"/>
+                                </a:rPr>
+                              </m:ctrlPr>
+                            </m:dPr>
+                            <m:e>
+                              <m:f>
+                                <m:fPr>
+                                  <m:ctrlPr>
+                                    <a:rPr lang="fr-FR" sz="1600" i="1">
+                                      <a:latin typeface="Cambria Math" panose="02040503050406030204" pitchFamily="18" charset="0"/>
+                                    </a:rPr>
+                                  </m:ctrlPr>
+                                </m:fPr>
+                                <m:num>
+                                  <m:r>
+                                    <a:rPr lang="fr-FR" sz="1600" i="1">
+                                      <a:latin typeface="Cambria Math" panose="02040503050406030204" pitchFamily="18" charset="0"/>
+                                    </a:rPr>
+                                    <m:t>𝑇𝑒𝑚𝑝𝑜</m:t>
+                                  </m:r>
+                                  <m:r>
+                                    <a:rPr lang="fr-FR" sz="1600" i="1">
+                                      <a:latin typeface="Cambria Math" panose="02040503050406030204" pitchFamily="18" charset="0"/>
+                                    </a:rPr>
+                                    <m:t> </m:t>
+                                  </m:r>
+                                  <m:r>
+                                    <a:rPr lang="fr-FR" sz="1600" i="1">
+                                      <a:latin typeface="Cambria Math" panose="02040503050406030204" pitchFamily="18" charset="0"/>
+                                    </a:rPr>
+                                    <m:t>𝑒𝑠𝑡𝑖𝑚</m:t>
+                                  </m:r>
+                                  <m:r>
+                                    <a:rPr lang="fr-FR" sz="1600" i="1">
+                                      <a:latin typeface="Cambria Math" panose="02040503050406030204" pitchFamily="18" charset="0"/>
+                                    </a:rPr>
+                                    <m:t>é</m:t>
+                                  </m:r>
+                                </m:num>
+                                <m:den>
+                                  <m:r>
+                                    <a:rPr lang="fr-FR" sz="1600" i="1">
+                                      <a:latin typeface="Cambria Math" panose="02040503050406030204" pitchFamily="18" charset="0"/>
+                                    </a:rPr>
+                                    <m:t>𝑇𝑒𝑚𝑝𝑜</m:t>
+                                  </m:r>
+                                  <m:r>
+                                    <a:rPr lang="fr-FR" sz="1600" i="1">
+                                      <a:latin typeface="Cambria Math" panose="02040503050406030204" pitchFamily="18" charset="0"/>
+                                    </a:rPr>
+                                    <m:t> </m:t>
+                                  </m:r>
+                                  <m:r>
+                                    <a:rPr lang="fr-FR" sz="1600" i="1">
+                                      <a:latin typeface="Cambria Math" panose="02040503050406030204" pitchFamily="18" charset="0"/>
+                                    </a:rPr>
+                                    <m:t>𝑎𝑡𝑡𝑒𝑛𝑑𝑢</m:t>
+                                  </m:r>
+                                </m:den>
+                              </m:f>
+                            </m:e>
+                          </m:d>
+                        </m:e>
+                      </m:d>
+                    </m:oMath>
+                  </m:oMathPara>
+                </a14:m>
+                <a:endParaRPr lang="fr-FR" sz="1600" dirty="0"/>
+              </a:p>
+            </p:txBody>
+          </p:sp>
+        </mc:Choice>
+        <mc:Fallback>
+          <p:sp>
+            <p:nvSpPr>
+              <p:cNvPr id="7" name="ZoneTexte 6"/>
+              <p:cNvSpPr txBox="1">
+                <a:spLocks noRot="1" noChangeAspect="1" noMove="1" noResize="1" noEditPoints="1" noAdjustHandles="1" noChangeArrowheads="1" noChangeShapeType="1" noTextEdit="1"/>
+              </p:cNvSpPr>
+              <p:nvPr/>
+            </p:nvSpPr>
+            <p:spPr>
+              <a:xfrm>
+                <a:off x="7692648" y="3812789"/>
+                <a:ext cx="4050861" cy="1138004"/>
+              </a:xfrm>
+              <a:prstGeom prst="rect">
+                <a:avLst/>
+              </a:prstGeom>
+              <a:blipFill rotWithShape="0">
+                <a:blip r:embed="rId3"/>
+                <a:stretch>
+                  <a:fillRect l="-904" t="-1604"/>
+                </a:stretch>
+              </a:blipFill>
+            </p:spPr>
+            <p:txBody>
+              <a:bodyPr/>
+              <a:lstStyle/>
+              <a:p>
+                <a:r>
+                  <a:rPr lang="fr-FR">
+                    <a:noFill/>
+                  </a:rPr>
+                  <a:t> </a:t>
+                </a:r>
+              </a:p>
+            </p:txBody>
+          </p:sp>
+        </mc:Fallback>
+      </mc:AlternateContent>
+      <p:sp>
+        <p:nvSpPr>
+          <p:cNvPr id="9" name="Espace réservé du contenu 2"/>
+          <p:cNvSpPr txBox="1">
+            <a:spLocks/>
+          </p:cNvSpPr>
+          <p:nvPr/>
+        </p:nvSpPr>
+        <p:spPr bwMode="auto">
+          <a:xfrm>
+            <a:off x="7955280" y="1910987"/>
+            <a:ext cx="4140927" cy="1589859"/>
+          </a:xfrm>
+          <a:prstGeom prst="rect">
+            <a:avLst/>
+          </a:prstGeom>
+          <a:noFill/>
+          <a:ln>
+            <a:noFill/>
+          </a:ln>
+          <a:effectLst/>
+          <a:extLst>
+            <a:ext uri="{909E8E84-426E-40DD-AFC4-6F175D3DCCD1}">
+              <a14:hiddenFill xmlns:a14="http://schemas.microsoft.com/office/drawing/2010/main">
+                <a:solidFill>
+                  <a:schemeClr val="accent1"/>
+                </a:solidFill>
+              </a14:hiddenFill>
+            </a:ext>
+            <a:ext uri="{91240B29-F687-4F45-9708-019B960494DF}">
+              <a14:hiddenLine xmlns:a14="http://schemas.microsoft.com/office/drawing/2010/main" w="9525">
+                <a:solidFill>
+                  <a:schemeClr val="tx1"/>
+                </a:solidFill>
+                <a:miter lim="800000"/>
+                <a:headEnd/>
+                <a:tailEnd/>
+              </a14:hiddenLine>
+            </a:ext>
+            <a:ext uri="{AF507438-7753-43E0-B8FC-AC1667EBCBE1}">
+              <a14:hiddenEffects xmlns:a14="http://schemas.microsoft.com/office/drawing/2010/main">
+                <a:effectLst>
+                  <a:outerShdw dist="35921" dir="2700000" algn="ctr" rotWithShape="0">
+                    <a:schemeClr val="bg2"/>
+                  </a:outerShdw>
+                </a:effectLst>
+              </a14:hiddenEffects>
+            </a:ext>
+          </a:extLst>
+        </p:spPr>
+        <p:txBody>
+          <a:bodyPr vert="horz" wrap="square" lIns="91440" tIns="45720" rIns="91440" bIns="45720" numCol="1" anchor="t" anchorCtr="0" compatLnSpc="1">
+            <a:prstTxWarp prst="textNoShape">
+              <a:avLst/>
+            </a:prstTxWarp>
+          </a:bodyPr>
+          <a:lstStyle>
+            <a:lvl1pPr marL="342900" indent="-342900" algn="l" rtl="0" eaLnBrk="1" fontAlgn="base" hangingPunct="1">
+              <a:spcBef>
+                <a:spcPct val="20000"/>
+              </a:spcBef>
+              <a:spcAft>
+                <a:spcPct val="0"/>
+              </a:spcAft>
+              <a:defRPr sz="2400" b="1" kern="1200">
+                <a:solidFill>
+                  <a:schemeClr val="accent2"/>
+                </a:solidFill>
+                <a:latin typeface="+mn-lt"/>
+                <a:ea typeface="+mn-ea"/>
+                <a:cs typeface="+mn-cs"/>
+              </a:defRPr>
+            </a:lvl1pPr>
+            <a:lvl2pPr marL="742950" indent="-285750" algn="l" rtl="0" eaLnBrk="1" fontAlgn="base" hangingPunct="1">
+              <a:spcBef>
+                <a:spcPct val="20000"/>
+              </a:spcBef>
+              <a:spcAft>
+                <a:spcPct val="0"/>
+              </a:spcAft>
+              <a:defRPr sz="2400" kern="1200">
+                <a:solidFill>
+                  <a:schemeClr val="tx1"/>
+                </a:solidFill>
+                <a:latin typeface="+mn-lt"/>
+                <a:ea typeface="+mn-ea"/>
+                <a:cs typeface="+mn-cs"/>
+              </a:defRPr>
+            </a:lvl2pPr>
+            <a:lvl3pPr marL="1143000" indent="-228600" algn="l" rtl="0" eaLnBrk="1" fontAlgn="base" hangingPunct="1">
+              <a:spcBef>
+                <a:spcPct val="20000"/>
+              </a:spcBef>
+              <a:spcAft>
+                <a:spcPct val="0"/>
+              </a:spcAft>
+              <a:buChar char="•"/>
+              <a:defRPr sz="2400" kern="1200">
+                <a:solidFill>
+                  <a:schemeClr val="tx1"/>
+                </a:solidFill>
+                <a:latin typeface="+mn-lt"/>
+                <a:ea typeface="+mn-ea"/>
+                <a:cs typeface="+mn-cs"/>
+              </a:defRPr>
+            </a:lvl3pPr>
+            <a:lvl4pPr marL="1600200" indent="-228600" algn="l" rtl="0" eaLnBrk="1" fontAlgn="base" hangingPunct="1">
+              <a:spcBef>
+                <a:spcPct val="20000"/>
+              </a:spcBef>
+              <a:spcAft>
+                <a:spcPct val="0"/>
+              </a:spcAft>
+              <a:defRPr sz="2400" kern="1200">
+                <a:solidFill>
+                  <a:schemeClr val="tx1"/>
+                </a:solidFill>
+                <a:latin typeface="+mn-lt"/>
+                <a:ea typeface="+mn-ea"/>
+                <a:cs typeface="+mn-cs"/>
+              </a:defRPr>
+            </a:lvl4pPr>
+            <a:lvl5pPr marL="2057400" indent="-228600" algn="l" rtl="0" eaLnBrk="1" fontAlgn="base" hangingPunct="1">
+              <a:spcBef>
+                <a:spcPct val="20000"/>
+              </a:spcBef>
+              <a:spcAft>
+                <a:spcPct val="0"/>
+              </a:spcAft>
+              <a:buChar char="»"/>
+              <a:defRPr sz="2400" kern="1200">
+                <a:solidFill>
+                  <a:schemeClr val="tx1"/>
+                </a:solidFill>
+                <a:latin typeface="+mn-lt"/>
+                <a:ea typeface="+mn-ea"/>
+                <a:cs typeface="+mn-cs"/>
+              </a:defRPr>
+            </a:lvl5pPr>
+            <a:lvl6pPr marL="2514600" indent="-228600" algn="l" defTabSz="914400" rtl="0" eaLnBrk="1" latinLnBrk="0" hangingPunct="1">
+              <a:lnSpc>
+                <a:spcPct val="90000"/>
+              </a:lnSpc>
+              <a:spcBef>
+                <a:spcPts val="500"/>
+              </a:spcBef>
+              <a:buFont typeface="Arial" panose="020B0604020202020204" pitchFamily="34" charset="0"/>
+              <a:buChar char="•"/>
+              <a:defRPr sz="1800" kern="1200">
+                <a:solidFill>
+                  <a:schemeClr val="tx1"/>
+                </a:solidFill>
+                <a:latin typeface="+mn-lt"/>
+                <a:ea typeface="+mn-ea"/>
+                <a:cs typeface="+mn-cs"/>
+              </a:defRPr>
+            </a:lvl6pPr>
+            <a:lvl7pPr marL="2971800" indent="-228600" algn="l" defTabSz="914400" rtl="0" eaLnBrk="1" latinLnBrk="0" hangingPunct="1">
+              <a:lnSpc>
+                <a:spcPct val="90000"/>
+              </a:lnSpc>
+              <a:spcBef>
+                <a:spcPts val="500"/>
+              </a:spcBef>
+              <a:buFont typeface="Arial" panose="020B0604020202020204" pitchFamily="34" charset="0"/>
+              <a:buChar char="•"/>
+              <a:defRPr sz="1800" kern="1200">
+                <a:solidFill>
+                  <a:schemeClr val="tx1"/>
+                </a:solidFill>
+                <a:latin typeface="+mn-lt"/>
+                <a:ea typeface="+mn-ea"/>
+                <a:cs typeface="+mn-cs"/>
+              </a:defRPr>
+            </a:lvl7pPr>
+            <a:lvl8pPr marL="3429000" indent="-228600" algn="l" defTabSz="914400" rtl="0" eaLnBrk="1" latinLnBrk="0" hangingPunct="1">
+              <a:lnSpc>
+                <a:spcPct val="90000"/>
+              </a:lnSpc>
+              <a:spcBef>
+                <a:spcPts val="500"/>
+              </a:spcBef>
+              <a:buFont typeface="Arial" panose="020B0604020202020204" pitchFamily="34" charset="0"/>
+              <a:buChar char="•"/>
+              <a:defRPr sz="1800" kern="1200">
+                <a:solidFill>
+                  <a:schemeClr val="tx1"/>
+                </a:solidFill>
+                <a:latin typeface="+mn-lt"/>
+                <a:ea typeface="+mn-ea"/>
+                <a:cs typeface="+mn-cs"/>
+              </a:defRPr>
+            </a:lvl8pPr>
+            <a:lvl9pPr marL="3886200" indent="-228600" algn="l" defTabSz="914400" rtl="0" eaLnBrk="1" latinLnBrk="0" hangingPunct="1">
+              <a:lnSpc>
+                <a:spcPct val="90000"/>
+              </a:lnSpc>
+              <a:spcBef>
+                <a:spcPts val="500"/>
+              </a:spcBef>
+              <a:buFont typeface="Arial" panose="020B0604020202020204" pitchFamily="34" charset="0"/>
+              <a:buChar char="•"/>
+              <a:defRPr sz="1800" kern="1200">
+                <a:solidFill>
+                  <a:schemeClr val="tx1"/>
+                </a:solidFill>
+                <a:latin typeface="+mn-lt"/>
+                <a:ea typeface="+mn-ea"/>
+                <a:cs typeface="+mn-cs"/>
+              </a:defRPr>
+            </a:lvl9pPr>
+          </a:lstStyle>
+          <a:p>
+            <a:pPr marL="0"/>
+            <a:r>
+              <a:rPr lang="fr-FR" sz="2000" dirty="0" smtClean="0"/>
+              <a:t>Rapport moyen final:</a:t>
+            </a:r>
+          </a:p>
+          <a:p>
+            <a:pPr marL="0"/>
+            <a:r>
+              <a:rPr lang="fr-FR" sz="2000" b="0" i="1" dirty="0" smtClean="0"/>
+              <a:t>(sur 11 morceaux)</a:t>
+            </a:r>
+            <a:endParaRPr lang="fr-FR" sz="2000" dirty="0" smtClean="0"/>
+          </a:p>
+          <a:p>
+            <a:pPr marL="0"/>
+            <a:endParaRPr lang="fr-FR" sz="2000" i="1" dirty="0"/>
+          </a:p>
+          <a:p>
+            <a:pPr marL="0" algn="ctr"/>
+            <a:r>
+              <a:rPr lang="fr-FR" sz="2000" i="1" dirty="0" smtClean="0"/>
+              <a:t>0,309</a:t>
+            </a:r>
+            <a:endParaRPr lang="fr-FR" i="1" dirty="0"/>
+          </a:p>
+        </p:txBody>
+      </p:sp>
+      <p:pic>
+        <p:nvPicPr>
+          <p:cNvPr id="8" name="Espace réservé du contenu 7"/>
+          <p:cNvPicPr>
+            <a:picLocks noGrp="1" noChangeAspect="1"/>
+          </p:cNvPicPr>
+          <p:nvPr>
+            <p:ph idx="1"/>
+          </p:nvPr>
+        </p:nvPicPr>
+        <p:blipFill rotWithShape="1">
+          <a:blip r:embed="rId4">
+            <a:extLst>
+              <a:ext uri="{28A0092B-C50C-407E-A947-70E740481C1C}">
+                <a14:useLocalDpi xmlns:a14="http://schemas.microsoft.com/office/drawing/2010/main" val="0"/>
+              </a:ext>
+            </a:extLst>
+          </a:blip>
+          <a:srcRect l="8434" r="7171"/>
+          <a:stretch/>
+        </p:blipFill>
+        <p:spPr>
+          <a:xfrm>
+            <a:off x="239185" y="1141355"/>
+            <a:ext cx="7354389" cy="4266667"/>
+          </a:xfrm>
+        </p:spPr>
+      </p:pic>
+    </p:spTree>
+    <p:extLst>
+      <p:ext uri="{BB962C8B-B14F-4D97-AF65-F5344CB8AC3E}">
+        <p14:creationId xmlns:p14="http://schemas.microsoft.com/office/powerpoint/2010/main" val="2305392729"/>
+      </p:ext>
+    </p:extLst>
+  </p:cSld>
+  <p:clrMapOvr>
+    <a:masterClrMapping/>
+  </p:clrMapOvr>
+</p:sld>
+</file>
+
+<file path=ppt/slides/slide13.xml><?xml version="1.0" encoding="utf-8"?>
+<p:sld xmlns:a="http://schemas.openxmlformats.org/drawingml/2006/main" xmlns:r="http://schemas.openxmlformats.org/officeDocument/2006/relationships" xmlns:p="http://schemas.openxmlformats.org/presentationml/2006/main">
+  <p:cSld>
+    <p:spTree>
+      <p:nvGrpSpPr>
+        <p:cNvPr id="1" name=""/>
+        <p:cNvGrpSpPr/>
+        <p:nvPr/>
+      </p:nvGrpSpPr>
+      <p:grpSpPr>
+        <a:xfrm>
+          <a:off x="0" y="0"/>
+          <a:ext cx="0" cy="0"/>
+          <a:chOff x="0" y="0"/>
+          <a:chExt cx="0" cy="0"/>
+        </a:xfrm>
+      </p:grpSpPr>
+      <p:sp>
+        <p:nvSpPr>
+          <p:cNvPr id="2" name="Titre 1"/>
+          <p:cNvSpPr>
+            <a:spLocks noGrp="1"/>
+          </p:cNvSpPr>
+          <p:nvPr>
+            <p:ph type="title"/>
+          </p:nvPr>
+        </p:nvSpPr>
+        <p:spPr/>
+        <p:txBody>
+          <a:bodyPr/>
+          <a:lstStyle/>
+          <a:p>
+            <a:r>
               <a:rPr lang="fr-FR" dirty="0" smtClean="0"/>
               <a:t>Analyse de la composition rythmique</a:t>
             </a:r>
@@ -5673,7 +7578,7 @@
           <a:p>
             <a:fld id="{AC23D0E6-50B7-48D2-8E06-55790222EDB8}" type="slidenum">
               <a:rPr lang="fr-FR" smtClean="0"/>
-              <a:t>10</a:t>
+              <a:t>13</a:t>
             </a:fld>
             <a:endParaRPr lang="fr-FR"/>
           </a:p>
@@ -5904,7 +7809,7 @@
 </p:sld>
 </file>
 
-<file path=ppt/slides/slide11.xml><?xml version="1.0" encoding="utf-8"?>
+<file path=ppt/slides/slide14.xml><?xml version="1.0" encoding="utf-8"?>
 <p:sld xmlns:a="http://schemas.openxmlformats.org/drawingml/2006/main" xmlns:r="http://schemas.openxmlformats.org/officeDocument/2006/relationships" xmlns:p="http://schemas.openxmlformats.org/presentationml/2006/main">
   <p:cSld>
     <p:spTree>
@@ -5984,7 +7889,7 @@
           <a:p>
             <a:fld id="{AC23D0E6-50B7-48D2-8E06-55790222EDB8}" type="slidenum">
               <a:rPr lang="fr-FR" smtClean="0"/>
-              <a:t>11</a:t>
+              <a:t>14</a:t>
             </a:fld>
             <a:endParaRPr lang="fr-FR"/>
           </a:p>
@@ -6289,7 +8194,7 @@
 </p:sld>
 </file>
 
-<file path=ppt/slides/slide12.xml><?xml version="1.0" encoding="utf-8"?>
+<file path=ppt/slides/slide15.xml><?xml version="1.0" encoding="utf-8"?>
 <p:sld xmlns:a="http://schemas.openxmlformats.org/drawingml/2006/main" xmlns:r="http://schemas.openxmlformats.org/officeDocument/2006/relationships" xmlns:p="http://schemas.openxmlformats.org/presentationml/2006/main">
   <p:cSld>
     <p:spTree>
@@ -6388,7 +8293,7 @@
           <a:p>
             <a:fld id="{AC23D0E6-50B7-48D2-8E06-55790222EDB8}" type="slidenum">
               <a:rPr lang="fr-FR" smtClean="0"/>
-              <a:t>12</a:t>
+              <a:t>15</a:t>
             </a:fld>
             <a:endParaRPr lang="fr-FR"/>
           </a:p>
@@ -6407,7 +8312,7 @@
 </p:sld>
 </file>
 
-<file path=ppt/slides/slide13.xml><?xml version="1.0" encoding="utf-8"?>
+<file path=ppt/slides/slide16.xml><?xml version="1.0" encoding="utf-8"?>
 <p:sld xmlns:a="http://schemas.openxmlformats.org/drawingml/2006/main" xmlns:r="http://schemas.openxmlformats.org/officeDocument/2006/relationships" xmlns:p="http://schemas.openxmlformats.org/presentationml/2006/main">
   <p:cSld>
     <p:spTree>
@@ -6603,7 +8508,7 @@
           <a:p>
             <a:fld id="{AC23D0E6-50B7-48D2-8E06-55790222EDB8}" type="slidenum">
               <a:rPr lang="fr-FR" smtClean="0"/>
-              <a:t>13</a:t>
+              <a:t>16</a:t>
             </a:fld>
             <a:endParaRPr lang="fr-FR"/>
           </a:p>
@@ -8385,6 +10290,815 @@
           <a:p>
             <a:r>
               <a:rPr lang="fr-FR" dirty="0" smtClean="0"/>
+              <a:t>Évolution de la détection d’onset</a:t>
+            </a:r>
+            <a:endParaRPr lang="fr-FR" dirty="0"/>
+          </a:p>
+        </p:txBody>
+      </p:sp>
+      <p:sp>
+        <p:nvSpPr>
+          <p:cNvPr id="4" name="Espace réservé du pied de page 3"/>
+          <p:cNvSpPr>
+            <a:spLocks noGrp="1"/>
+          </p:cNvSpPr>
+          <p:nvPr>
+            <p:ph type="ftr" sz="quarter" idx="10"/>
+          </p:nvPr>
+        </p:nvSpPr>
+        <p:spPr/>
+        <p:txBody>
+          <a:bodyPr/>
+          <a:lstStyle/>
+          <a:p>
+            <a:r>
+              <a:rPr lang="fr-FR" smtClean="0"/>
+              <a:t>Projet de Fin d’étude – Générateur de Partition de de Musique – R. Gallard  - M.Laurent  - L.Riobé</a:t>
+            </a:r>
+            <a:endParaRPr lang="fr-FR"/>
+          </a:p>
+        </p:txBody>
+      </p:sp>
+      <p:sp>
+        <p:nvSpPr>
+          <p:cNvPr id="5" name="Espace réservé du numéro de diapositive 4"/>
+          <p:cNvSpPr>
+            <a:spLocks noGrp="1"/>
+          </p:cNvSpPr>
+          <p:nvPr>
+            <p:ph type="sldNum" sz="quarter" idx="11"/>
+          </p:nvPr>
+        </p:nvSpPr>
+        <p:spPr/>
+        <p:txBody>
+          <a:bodyPr/>
+          <a:lstStyle/>
+          <a:p>
+            <a:fld id="{AC23D0E6-50B7-48D2-8E06-55790222EDB8}" type="slidenum">
+              <a:rPr lang="fr-FR" smtClean="0"/>
+              <a:t>6</a:t>
+            </a:fld>
+            <a:endParaRPr lang="fr-FR"/>
+          </a:p>
+        </p:txBody>
+      </p:sp>
+      <p:sp>
+        <p:nvSpPr>
+          <p:cNvPr id="7" name="ZoneTexte 6"/>
+          <p:cNvSpPr txBox="1"/>
+          <p:nvPr/>
+        </p:nvSpPr>
+        <p:spPr>
+          <a:xfrm>
+            <a:off x="660706" y="5445648"/>
+            <a:ext cx="3749219" cy="338554"/>
+          </a:xfrm>
+          <a:prstGeom prst="rect">
+            <a:avLst/>
+          </a:prstGeom>
+          <a:noFill/>
+        </p:spPr>
+        <p:txBody>
+          <a:bodyPr wrap="square" rtlCol="0">
+            <a:spAutoFit/>
+          </a:bodyPr>
+          <a:lstStyle/>
+          <a:p>
+            <a:r>
+              <a:rPr lang="fr-FR" sz="1600" dirty="0" smtClean="0"/>
+              <a:t>*</a:t>
+            </a:r>
+            <a:r>
+              <a:rPr lang="fr-FR" sz="1600" i="1" dirty="0" smtClean="0"/>
+              <a:t>Les offsets ne sont jamais évalués</a:t>
+            </a:r>
+            <a:endParaRPr lang="fr-FR" sz="1600" dirty="0"/>
+          </a:p>
+        </p:txBody>
+      </p:sp>
+      <p:sp>
+        <p:nvSpPr>
+          <p:cNvPr id="9" name="Espace réservé du contenu 2"/>
+          <p:cNvSpPr txBox="1">
+            <a:spLocks/>
+          </p:cNvSpPr>
+          <p:nvPr/>
+        </p:nvSpPr>
+        <p:spPr bwMode="auto">
+          <a:xfrm>
+            <a:off x="7955280" y="1910987"/>
+            <a:ext cx="4140927" cy="3497035"/>
+          </a:xfrm>
+          <a:prstGeom prst="rect">
+            <a:avLst/>
+          </a:prstGeom>
+          <a:noFill/>
+          <a:ln>
+            <a:noFill/>
+          </a:ln>
+          <a:effectLst/>
+          <a:extLst>
+            <a:ext uri="{909E8E84-426E-40DD-AFC4-6F175D3DCCD1}">
+              <a14:hiddenFill xmlns:a14="http://schemas.microsoft.com/office/drawing/2010/main">
+                <a:solidFill>
+                  <a:schemeClr val="accent1"/>
+                </a:solidFill>
+              </a14:hiddenFill>
+            </a:ext>
+            <a:ext uri="{91240B29-F687-4F45-9708-019B960494DF}">
+              <a14:hiddenLine xmlns:a14="http://schemas.microsoft.com/office/drawing/2010/main" w="9525">
+                <a:solidFill>
+                  <a:schemeClr val="tx1"/>
+                </a:solidFill>
+                <a:miter lim="800000"/>
+                <a:headEnd/>
+                <a:tailEnd/>
+              </a14:hiddenLine>
+            </a:ext>
+            <a:ext uri="{AF507438-7753-43E0-B8FC-AC1667EBCBE1}">
+              <a14:hiddenEffects xmlns:a14="http://schemas.microsoft.com/office/drawing/2010/main">
+                <a:effectLst>
+                  <a:outerShdw dist="35921" dir="2700000" algn="ctr" rotWithShape="0">
+                    <a:schemeClr val="bg2"/>
+                  </a:outerShdw>
+                </a:effectLst>
+              </a14:hiddenEffects>
+            </a:ext>
+          </a:extLst>
+        </p:spPr>
+        <p:txBody>
+          <a:bodyPr vert="horz" wrap="square" lIns="91440" tIns="45720" rIns="91440" bIns="45720" numCol="1" anchor="t" anchorCtr="0" compatLnSpc="1">
+            <a:prstTxWarp prst="textNoShape">
+              <a:avLst/>
+            </a:prstTxWarp>
+          </a:bodyPr>
+          <a:lstStyle>
+            <a:lvl1pPr marL="342900" indent="-342900" algn="l" rtl="0" eaLnBrk="1" fontAlgn="base" hangingPunct="1">
+              <a:spcBef>
+                <a:spcPct val="20000"/>
+              </a:spcBef>
+              <a:spcAft>
+                <a:spcPct val="0"/>
+              </a:spcAft>
+              <a:defRPr sz="2400" b="1" kern="1200">
+                <a:solidFill>
+                  <a:schemeClr val="accent2"/>
+                </a:solidFill>
+                <a:latin typeface="+mn-lt"/>
+                <a:ea typeface="+mn-ea"/>
+                <a:cs typeface="+mn-cs"/>
+              </a:defRPr>
+            </a:lvl1pPr>
+            <a:lvl2pPr marL="742950" indent="-285750" algn="l" rtl="0" eaLnBrk="1" fontAlgn="base" hangingPunct="1">
+              <a:spcBef>
+                <a:spcPct val="20000"/>
+              </a:spcBef>
+              <a:spcAft>
+                <a:spcPct val="0"/>
+              </a:spcAft>
+              <a:defRPr sz="2400" kern="1200">
+                <a:solidFill>
+                  <a:schemeClr val="tx1"/>
+                </a:solidFill>
+                <a:latin typeface="+mn-lt"/>
+                <a:ea typeface="+mn-ea"/>
+                <a:cs typeface="+mn-cs"/>
+              </a:defRPr>
+            </a:lvl2pPr>
+            <a:lvl3pPr marL="1143000" indent="-228600" algn="l" rtl="0" eaLnBrk="1" fontAlgn="base" hangingPunct="1">
+              <a:spcBef>
+                <a:spcPct val="20000"/>
+              </a:spcBef>
+              <a:spcAft>
+                <a:spcPct val="0"/>
+              </a:spcAft>
+              <a:buChar char="•"/>
+              <a:defRPr sz="2400" kern="1200">
+                <a:solidFill>
+                  <a:schemeClr val="tx1"/>
+                </a:solidFill>
+                <a:latin typeface="+mn-lt"/>
+                <a:ea typeface="+mn-ea"/>
+                <a:cs typeface="+mn-cs"/>
+              </a:defRPr>
+            </a:lvl3pPr>
+            <a:lvl4pPr marL="1600200" indent="-228600" algn="l" rtl="0" eaLnBrk="1" fontAlgn="base" hangingPunct="1">
+              <a:spcBef>
+                <a:spcPct val="20000"/>
+              </a:spcBef>
+              <a:spcAft>
+                <a:spcPct val="0"/>
+              </a:spcAft>
+              <a:defRPr sz="2400" kern="1200">
+                <a:solidFill>
+                  <a:schemeClr val="tx1"/>
+                </a:solidFill>
+                <a:latin typeface="+mn-lt"/>
+                <a:ea typeface="+mn-ea"/>
+                <a:cs typeface="+mn-cs"/>
+              </a:defRPr>
+            </a:lvl4pPr>
+            <a:lvl5pPr marL="2057400" indent="-228600" algn="l" rtl="0" eaLnBrk="1" fontAlgn="base" hangingPunct="1">
+              <a:spcBef>
+                <a:spcPct val="20000"/>
+              </a:spcBef>
+              <a:spcAft>
+                <a:spcPct val="0"/>
+              </a:spcAft>
+              <a:buChar char="»"/>
+              <a:defRPr sz="2400" kern="1200">
+                <a:solidFill>
+                  <a:schemeClr val="tx1"/>
+                </a:solidFill>
+                <a:latin typeface="+mn-lt"/>
+                <a:ea typeface="+mn-ea"/>
+                <a:cs typeface="+mn-cs"/>
+              </a:defRPr>
+            </a:lvl5pPr>
+            <a:lvl6pPr marL="2514600" indent="-228600" algn="l" defTabSz="914400" rtl="0" eaLnBrk="1" latinLnBrk="0" hangingPunct="1">
+              <a:lnSpc>
+                <a:spcPct val="90000"/>
+              </a:lnSpc>
+              <a:spcBef>
+                <a:spcPts val="500"/>
+              </a:spcBef>
+              <a:buFont typeface="Arial" panose="020B0604020202020204" pitchFamily="34" charset="0"/>
+              <a:buChar char="•"/>
+              <a:defRPr sz="1800" kern="1200">
+                <a:solidFill>
+                  <a:schemeClr val="tx1"/>
+                </a:solidFill>
+                <a:latin typeface="+mn-lt"/>
+                <a:ea typeface="+mn-ea"/>
+                <a:cs typeface="+mn-cs"/>
+              </a:defRPr>
+            </a:lvl6pPr>
+            <a:lvl7pPr marL="2971800" indent="-228600" algn="l" defTabSz="914400" rtl="0" eaLnBrk="1" latinLnBrk="0" hangingPunct="1">
+              <a:lnSpc>
+                <a:spcPct val="90000"/>
+              </a:lnSpc>
+              <a:spcBef>
+                <a:spcPts val="500"/>
+              </a:spcBef>
+              <a:buFont typeface="Arial" panose="020B0604020202020204" pitchFamily="34" charset="0"/>
+              <a:buChar char="•"/>
+              <a:defRPr sz="1800" kern="1200">
+                <a:solidFill>
+                  <a:schemeClr val="tx1"/>
+                </a:solidFill>
+                <a:latin typeface="+mn-lt"/>
+                <a:ea typeface="+mn-ea"/>
+                <a:cs typeface="+mn-cs"/>
+              </a:defRPr>
+            </a:lvl7pPr>
+            <a:lvl8pPr marL="3429000" indent="-228600" algn="l" defTabSz="914400" rtl="0" eaLnBrk="1" latinLnBrk="0" hangingPunct="1">
+              <a:lnSpc>
+                <a:spcPct val="90000"/>
+              </a:lnSpc>
+              <a:spcBef>
+                <a:spcPts val="500"/>
+              </a:spcBef>
+              <a:buFont typeface="Arial" panose="020B0604020202020204" pitchFamily="34" charset="0"/>
+              <a:buChar char="•"/>
+              <a:defRPr sz="1800" kern="1200">
+                <a:solidFill>
+                  <a:schemeClr val="tx1"/>
+                </a:solidFill>
+                <a:latin typeface="+mn-lt"/>
+                <a:ea typeface="+mn-ea"/>
+                <a:cs typeface="+mn-cs"/>
+              </a:defRPr>
+            </a:lvl8pPr>
+            <a:lvl9pPr marL="3886200" indent="-228600" algn="l" defTabSz="914400" rtl="0" eaLnBrk="1" latinLnBrk="0" hangingPunct="1">
+              <a:lnSpc>
+                <a:spcPct val="90000"/>
+              </a:lnSpc>
+              <a:spcBef>
+                <a:spcPts val="500"/>
+              </a:spcBef>
+              <a:buFont typeface="Arial" panose="020B0604020202020204" pitchFamily="34" charset="0"/>
+              <a:buChar char="•"/>
+              <a:defRPr sz="1800" kern="1200">
+                <a:solidFill>
+                  <a:schemeClr val="tx1"/>
+                </a:solidFill>
+                <a:latin typeface="+mn-lt"/>
+                <a:ea typeface="+mn-ea"/>
+                <a:cs typeface="+mn-cs"/>
+              </a:defRPr>
+            </a:lvl9pPr>
+          </a:lstStyle>
+          <a:p>
+            <a:pPr marL="0"/>
+            <a:r>
+              <a:rPr lang="fr-FR" sz="2000" dirty="0" smtClean="0"/>
+              <a:t>Taux de détection final sur notre jeu de données :</a:t>
+            </a:r>
+          </a:p>
+          <a:p>
+            <a:pPr marL="0"/>
+            <a:r>
+              <a:rPr lang="fr-FR" sz="2000" b="0" i="1" dirty="0" smtClean="0"/>
+              <a:t>(8min30 ou 946 notes)</a:t>
+            </a:r>
+          </a:p>
+          <a:p>
+            <a:pPr marL="0"/>
+            <a:endParaRPr lang="fr-FR" sz="2000" b="0" i="1" dirty="0"/>
+          </a:p>
+          <a:p>
+            <a:pPr marL="0" algn="ctr"/>
+            <a:r>
+              <a:rPr lang="fr-FR" sz="2800" i="1" dirty="0" smtClean="0"/>
+              <a:t>96,04%</a:t>
+            </a:r>
+            <a:endParaRPr lang="fr-FR" sz="3200" i="1" dirty="0"/>
+          </a:p>
+        </p:txBody>
+      </p:sp>
+      <p:pic>
+        <p:nvPicPr>
+          <p:cNvPr id="11" name="Espace réservé du contenu 10"/>
+          <p:cNvPicPr>
+            <a:picLocks noGrp="1" noChangeAspect="1"/>
+          </p:cNvPicPr>
+          <p:nvPr>
+            <p:ph idx="1"/>
+          </p:nvPr>
+        </p:nvPicPr>
+        <p:blipFill rotWithShape="1">
+          <a:blip r:embed="rId2">
+            <a:extLst>
+              <a:ext uri="{28A0092B-C50C-407E-A947-70E740481C1C}">
+                <a14:useLocalDpi xmlns:a14="http://schemas.microsoft.com/office/drawing/2010/main" val="0"/>
+              </a:ext>
+            </a:extLst>
+          </a:blip>
+          <a:srcRect l="7628" r="2731"/>
+          <a:stretch/>
+        </p:blipFill>
+        <p:spPr>
+          <a:xfrm>
+            <a:off x="143691" y="1141355"/>
+            <a:ext cx="7811589" cy="4266667"/>
+          </a:xfrm>
+        </p:spPr>
+      </p:pic>
+    </p:spTree>
+    <p:extLst>
+      <p:ext uri="{BB962C8B-B14F-4D97-AF65-F5344CB8AC3E}">
+        <p14:creationId xmlns:p14="http://schemas.microsoft.com/office/powerpoint/2010/main" val="8996639"/>
+      </p:ext>
+    </p:extLst>
+  </p:cSld>
+  <p:clrMapOvr>
+    <a:masterClrMapping/>
+  </p:clrMapOvr>
+</p:sld>
+</file>
+
+<file path=ppt/slides/slide7.xml><?xml version="1.0" encoding="utf-8"?>
+<p:sld xmlns:a="http://schemas.openxmlformats.org/drawingml/2006/main" xmlns:r="http://schemas.openxmlformats.org/officeDocument/2006/relationships" xmlns:p="http://schemas.openxmlformats.org/presentationml/2006/main">
+  <p:cSld>
+    <p:spTree>
+      <p:nvGrpSpPr>
+        <p:cNvPr id="1" name=""/>
+        <p:cNvGrpSpPr/>
+        <p:nvPr/>
+      </p:nvGrpSpPr>
+      <p:grpSpPr>
+        <a:xfrm>
+          <a:off x="0" y="0"/>
+          <a:ext cx="0" cy="0"/>
+          <a:chOff x="0" y="0"/>
+          <a:chExt cx="0" cy="0"/>
+        </a:xfrm>
+      </p:grpSpPr>
+      <p:sp>
+        <p:nvSpPr>
+          <p:cNvPr id="2" name="Titre 1"/>
+          <p:cNvSpPr>
+            <a:spLocks noGrp="1"/>
+          </p:cNvSpPr>
+          <p:nvPr>
+            <p:ph type="title"/>
+          </p:nvPr>
+        </p:nvSpPr>
+        <p:spPr/>
+        <p:txBody>
+          <a:bodyPr/>
+          <a:lstStyle/>
+          <a:p>
+            <a:r>
+              <a:rPr lang="fr-FR" dirty="0" smtClean="0"/>
+              <a:t>Évolution de l’analyse harmonique</a:t>
+            </a:r>
+            <a:endParaRPr lang="fr-FR" dirty="0"/>
+          </a:p>
+        </p:txBody>
+      </p:sp>
+      <p:sp>
+        <p:nvSpPr>
+          <p:cNvPr id="4" name="Espace réservé du pied de page 3"/>
+          <p:cNvSpPr>
+            <a:spLocks noGrp="1"/>
+          </p:cNvSpPr>
+          <p:nvPr>
+            <p:ph type="ftr" sz="quarter" idx="10"/>
+          </p:nvPr>
+        </p:nvSpPr>
+        <p:spPr/>
+        <p:txBody>
+          <a:bodyPr/>
+          <a:lstStyle/>
+          <a:p>
+            <a:r>
+              <a:rPr lang="fr-FR" smtClean="0"/>
+              <a:t>Projet de Fin d’étude – Générateur de Partition de de Musique – R. Gallard  - M.Laurent  - L.Riobé</a:t>
+            </a:r>
+            <a:endParaRPr lang="fr-FR"/>
+          </a:p>
+        </p:txBody>
+      </p:sp>
+      <p:sp>
+        <p:nvSpPr>
+          <p:cNvPr id="5" name="Espace réservé du numéro de diapositive 4"/>
+          <p:cNvSpPr>
+            <a:spLocks noGrp="1"/>
+          </p:cNvSpPr>
+          <p:nvPr>
+            <p:ph type="sldNum" sz="quarter" idx="11"/>
+          </p:nvPr>
+        </p:nvSpPr>
+        <p:spPr/>
+        <p:txBody>
+          <a:bodyPr/>
+          <a:lstStyle/>
+          <a:p>
+            <a:fld id="{AC23D0E6-50B7-48D2-8E06-55790222EDB8}" type="slidenum">
+              <a:rPr lang="fr-FR" smtClean="0"/>
+              <a:t>7</a:t>
+            </a:fld>
+            <a:endParaRPr lang="fr-FR"/>
+          </a:p>
+        </p:txBody>
+      </p:sp>
+      <p:sp>
+        <p:nvSpPr>
+          <p:cNvPr id="7" name="ZoneTexte 6"/>
+          <p:cNvSpPr txBox="1"/>
+          <p:nvPr/>
+        </p:nvSpPr>
+        <p:spPr>
+          <a:xfrm>
+            <a:off x="660706" y="5445648"/>
+            <a:ext cx="5896848" cy="584775"/>
+          </a:xfrm>
+          <a:prstGeom prst="rect">
+            <a:avLst/>
+          </a:prstGeom>
+          <a:noFill/>
+        </p:spPr>
+        <p:txBody>
+          <a:bodyPr wrap="square" rtlCol="0">
+            <a:spAutoFit/>
+          </a:bodyPr>
+          <a:lstStyle/>
+          <a:p>
+            <a:r>
+              <a:rPr lang="fr-FR" sz="1600" dirty="0" smtClean="0"/>
+              <a:t>*</a:t>
+            </a:r>
+            <a:r>
+              <a:rPr lang="fr-FR" sz="1600" i="1" dirty="0" smtClean="0"/>
+              <a:t>Les silences ne sont jamais évalués, les notes liées à un onset faussement détecté ou manqué ne sont pas évaluées</a:t>
+            </a:r>
+            <a:endParaRPr lang="fr-FR" sz="1600" dirty="0"/>
+          </a:p>
+        </p:txBody>
+      </p:sp>
+      <p:sp>
+        <p:nvSpPr>
+          <p:cNvPr id="9" name="Espace réservé du contenu 2"/>
+          <p:cNvSpPr txBox="1">
+            <a:spLocks/>
+          </p:cNvSpPr>
+          <p:nvPr/>
+        </p:nvSpPr>
+        <p:spPr bwMode="auto">
+          <a:xfrm>
+            <a:off x="7955280" y="1910987"/>
+            <a:ext cx="4140927" cy="3497035"/>
+          </a:xfrm>
+          <a:prstGeom prst="rect">
+            <a:avLst/>
+          </a:prstGeom>
+          <a:noFill/>
+          <a:ln>
+            <a:noFill/>
+          </a:ln>
+          <a:effectLst/>
+          <a:extLst>
+            <a:ext uri="{909E8E84-426E-40DD-AFC4-6F175D3DCCD1}">
+              <a14:hiddenFill xmlns:a14="http://schemas.microsoft.com/office/drawing/2010/main">
+                <a:solidFill>
+                  <a:schemeClr val="accent1"/>
+                </a:solidFill>
+              </a14:hiddenFill>
+            </a:ext>
+            <a:ext uri="{91240B29-F687-4F45-9708-019B960494DF}">
+              <a14:hiddenLine xmlns:a14="http://schemas.microsoft.com/office/drawing/2010/main" w="9525">
+                <a:solidFill>
+                  <a:schemeClr val="tx1"/>
+                </a:solidFill>
+                <a:miter lim="800000"/>
+                <a:headEnd/>
+                <a:tailEnd/>
+              </a14:hiddenLine>
+            </a:ext>
+            <a:ext uri="{AF507438-7753-43E0-B8FC-AC1667EBCBE1}">
+              <a14:hiddenEffects xmlns:a14="http://schemas.microsoft.com/office/drawing/2010/main">
+                <a:effectLst>
+                  <a:outerShdw dist="35921" dir="2700000" algn="ctr" rotWithShape="0">
+                    <a:schemeClr val="bg2"/>
+                  </a:outerShdw>
+                </a:effectLst>
+              </a14:hiddenEffects>
+            </a:ext>
+          </a:extLst>
+        </p:spPr>
+        <p:txBody>
+          <a:bodyPr vert="horz" wrap="square" lIns="91440" tIns="45720" rIns="91440" bIns="45720" numCol="1" anchor="t" anchorCtr="0" compatLnSpc="1">
+            <a:prstTxWarp prst="textNoShape">
+              <a:avLst/>
+            </a:prstTxWarp>
+          </a:bodyPr>
+          <a:lstStyle>
+            <a:lvl1pPr marL="342900" indent="-342900" algn="l" rtl="0" eaLnBrk="1" fontAlgn="base" hangingPunct="1">
+              <a:spcBef>
+                <a:spcPct val="20000"/>
+              </a:spcBef>
+              <a:spcAft>
+                <a:spcPct val="0"/>
+              </a:spcAft>
+              <a:defRPr sz="2400" b="1" kern="1200">
+                <a:solidFill>
+                  <a:schemeClr val="accent2"/>
+                </a:solidFill>
+                <a:latin typeface="+mn-lt"/>
+                <a:ea typeface="+mn-ea"/>
+                <a:cs typeface="+mn-cs"/>
+              </a:defRPr>
+            </a:lvl1pPr>
+            <a:lvl2pPr marL="742950" indent="-285750" algn="l" rtl="0" eaLnBrk="1" fontAlgn="base" hangingPunct="1">
+              <a:spcBef>
+                <a:spcPct val="20000"/>
+              </a:spcBef>
+              <a:spcAft>
+                <a:spcPct val="0"/>
+              </a:spcAft>
+              <a:defRPr sz="2400" kern="1200">
+                <a:solidFill>
+                  <a:schemeClr val="tx1"/>
+                </a:solidFill>
+                <a:latin typeface="+mn-lt"/>
+                <a:ea typeface="+mn-ea"/>
+                <a:cs typeface="+mn-cs"/>
+              </a:defRPr>
+            </a:lvl2pPr>
+            <a:lvl3pPr marL="1143000" indent="-228600" algn="l" rtl="0" eaLnBrk="1" fontAlgn="base" hangingPunct="1">
+              <a:spcBef>
+                <a:spcPct val="20000"/>
+              </a:spcBef>
+              <a:spcAft>
+                <a:spcPct val="0"/>
+              </a:spcAft>
+              <a:buChar char="•"/>
+              <a:defRPr sz="2400" kern="1200">
+                <a:solidFill>
+                  <a:schemeClr val="tx1"/>
+                </a:solidFill>
+                <a:latin typeface="+mn-lt"/>
+                <a:ea typeface="+mn-ea"/>
+                <a:cs typeface="+mn-cs"/>
+              </a:defRPr>
+            </a:lvl3pPr>
+            <a:lvl4pPr marL="1600200" indent="-228600" algn="l" rtl="0" eaLnBrk="1" fontAlgn="base" hangingPunct="1">
+              <a:spcBef>
+                <a:spcPct val="20000"/>
+              </a:spcBef>
+              <a:spcAft>
+                <a:spcPct val="0"/>
+              </a:spcAft>
+              <a:defRPr sz="2400" kern="1200">
+                <a:solidFill>
+                  <a:schemeClr val="tx1"/>
+                </a:solidFill>
+                <a:latin typeface="+mn-lt"/>
+                <a:ea typeface="+mn-ea"/>
+                <a:cs typeface="+mn-cs"/>
+              </a:defRPr>
+            </a:lvl4pPr>
+            <a:lvl5pPr marL="2057400" indent="-228600" algn="l" rtl="0" eaLnBrk="1" fontAlgn="base" hangingPunct="1">
+              <a:spcBef>
+                <a:spcPct val="20000"/>
+              </a:spcBef>
+              <a:spcAft>
+                <a:spcPct val="0"/>
+              </a:spcAft>
+              <a:buChar char="»"/>
+              <a:defRPr sz="2400" kern="1200">
+                <a:solidFill>
+                  <a:schemeClr val="tx1"/>
+                </a:solidFill>
+                <a:latin typeface="+mn-lt"/>
+                <a:ea typeface="+mn-ea"/>
+                <a:cs typeface="+mn-cs"/>
+              </a:defRPr>
+            </a:lvl5pPr>
+            <a:lvl6pPr marL="2514600" indent="-228600" algn="l" defTabSz="914400" rtl="0" eaLnBrk="1" latinLnBrk="0" hangingPunct="1">
+              <a:lnSpc>
+                <a:spcPct val="90000"/>
+              </a:lnSpc>
+              <a:spcBef>
+                <a:spcPts val="500"/>
+              </a:spcBef>
+              <a:buFont typeface="Arial" panose="020B0604020202020204" pitchFamily="34" charset="0"/>
+              <a:buChar char="•"/>
+              <a:defRPr sz="1800" kern="1200">
+                <a:solidFill>
+                  <a:schemeClr val="tx1"/>
+                </a:solidFill>
+                <a:latin typeface="+mn-lt"/>
+                <a:ea typeface="+mn-ea"/>
+                <a:cs typeface="+mn-cs"/>
+              </a:defRPr>
+            </a:lvl6pPr>
+            <a:lvl7pPr marL="2971800" indent="-228600" algn="l" defTabSz="914400" rtl="0" eaLnBrk="1" latinLnBrk="0" hangingPunct="1">
+              <a:lnSpc>
+                <a:spcPct val="90000"/>
+              </a:lnSpc>
+              <a:spcBef>
+                <a:spcPts val="500"/>
+              </a:spcBef>
+              <a:buFont typeface="Arial" panose="020B0604020202020204" pitchFamily="34" charset="0"/>
+              <a:buChar char="•"/>
+              <a:defRPr sz="1800" kern="1200">
+                <a:solidFill>
+                  <a:schemeClr val="tx1"/>
+                </a:solidFill>
+                <a:latin typeface="+mn-lt"/>
+                <a:ea typeface="+mn-ea"/>
+                <a:cs typeface="+mn-cs"/>
+              </a:defRPr>
+            </a:lvl7pPr>
+            <a:lvl8pPr marL="3429000" indent="-228600" algn="l" defTabSz="914400" rtl="0" eaLnBrk="1" latinLnBrk="0" hangingPunct="1">
+              <a:lnSpc>
+                <a:spcPct val="90000"/>
+              </a:lnSpc>
+              <a:spcBef>
+                <a:spcPts val="500"/>
+              </a:spcBef>
+              <a:buFont typeface="Arial" panose="020B0604020202020204" pitchFamily="34" charset="0"/>
+              <a:buChar char="•"/>
+              <a:defRPr sz="1800" kern="1200">
+                <a:solidFill>
+                  <a:schemeClr val="tx1"/>
+                </a:solidFill>
+                <a:latin typeface="+mn-lt"/>
+                <a:ea typeface="+mn-ea"/>
+                <a:cs typeface="+mn-cs"/>
+              </a:defRPr>
+            </a:lvl8pPr>
+            <a:lvl9pPr marL="3886200" indent="-228600" algn="l" defTabSz="914400" rtl="0" eaLnBrk="1" latinLnBrk="0" hangingPunct="1">
+              <a:lnSpc>
+                <a:spcPct val="90000"/>
+              </a:lnSpc>
+              <a:spcBef>
+                <a:spcPts val="500"/>
+              </a:spcBef>
+              <a:buFont typeface="Arial" panose="020B0604020202020204" pitchFamily="34" charset="0"/>
+              <a:buChar char="•"/>
+              <a:defRPr sz="1800" kern="1200">
+                <a:solidFill>
+                  <a:schemeClr val="tx1"/>
+                </a:solidFill>
+                <a:latin typeface="+mn-lt"/>
+                <a:ea typeface="+mn-ea"/>
+                <a:cs typeface="+mn-cs"/>
+              </a:defRPr>
+            </a:lvl9pPr>
+          </a:lstStyle>
+          <a:p>
+            <a:pPr marL="0"/>
+            <a:r>
+              <a:rPr lang="fr-FR" sz="2000" dirty="0" smtClean="0"/>
+              <a:t>Taux de détection* final sur notre jeu de données :</a:t>
+            </a:r>
+          </a:p>
+          <a:p>
+            <a:pPr marL="0"/>
+            <a:r>
+              <a:rPr lang="fr-FR" sz="2000" b="0" i="1" dirty="0" smtClean="0"/>
+              <a:t>(8min30 ou 946 notes)</a:t>
+            </a:r>
+          </a:p>
+          <a:p>
+            <a:pPr marL="0"/>
+            <a:endParaRPr lang="fr-FR" sz="2000" b="0" i="1" dirty="0"/>
+          </a:p>
+          <a:p>
+            <a:pPr marL="0" algn="ctr"/>
+            <a:r>
+              <a:rPr lang="fr-FR" sz="2800" i="1" dirty="0" smtClean="0"/>
+              <a:t>Tons: 93,08%</a:t>
+            </a:r>
+          </a:p>
+          <a:p>
+            <a:pPr marL="0" algn="ctr"/>
+            <a:r>
+              <a:rPr lang="fr-FR" sz="2800" i="1" dirty="0" smtClean="0"/>
+              <a:t>Octaves: 92,7%</a:t>
+            </a:r>
+            <a:endParaRPr lang="fr-FR" sz="3200" i="1" dirty="0"/>
+          </a:p>
+        </p:txBody>
+      </p:sp>
+      <p:pic>
+        <p:nvPicPr>
+          <p:cNvPr id="6" name="Espace réservé du contenu 5"/>
+          <p:cNvPicPr>
+            <a:picLocks noGrp="1" noChangeAspect="1"/>
+          </p:cNvPicPr>
+          <p:nvPr>
+            <p:ph idx="1"/>
+          </p:nvPr>
+        </p:nvPicPr>
+        <p:blipFill rotWithShape="1">
+          <a:blip r:embed="rId2">
+            <a:extLst>
+              <a:ext uri="{28A0092B-C50C-407E-A947-70E740481C1C}">
+                <a14:useLocalDpi xmlns:a14="http://schemas.microsoft.com/office/drawing/2010/main" val="0"/>
+              </a:ext>
+            </a:extLst>
+          </a:blip>
+          <a:srcRect l="6509" r="7897"/>
+          <a:stretch/>
+        </p:blipFill>
+        <p:spPr>
+          <a:xfrm>
+            <a:off x="435339" y="1141355"/>
+            <a:ext cx="7458891" cy="4266667"/>
+          </a:xfrm>
+        </p:spPr>
+      </p:pic>
+    </p:spTree>
+    <p:extLst>
+      <p:ext uri="{BB962C8B-B14F-4D97-AF65-F5344CB8AC3E}">
+        <p14:creationId xmlns:p14="http://schemas.microsoft.com/office/powerpoint/2010/main" val="2399857649"/>
+      </p:ext>
+    </p:extLst>
+  </p:cSld>
+  <p:clrMapOvr>
+    <a:masterClrMapping/>
+  </p:clrMapOvr>
+</p:sld>
+</file>
+
+<file path=ppt/slides/slide8.xml><?xml version="1.0" encoding="utf-8"?>
+<p:sld xmlns:a="http://schemas.openxmlformats.org/drawingml/2006/main" xmlns:r="http://schemas.openxmlformats.org/officeDocument/2006/relationships" xmlns:p="http://schemas.openxmlformats.org/presentationml/2006/main">
+  <p:cSld>
+    <p:spTree>
+      <p:nvGrpSpPr>
+        <p:cNvPr id="1" name=""/>
+        <p:cNvGrpSpPr/>
+        <p:nvPr/>
+      </p:nvGrpSpPr>
+      <p:grpSpPr>
+        <a:xfrm>
+          <a:off x="0" y="0"/>
+          <a:ext cx="0" cy="0"/>
+          <a:chOff x="0" y="0"/>
+          <a:chExt cx="0" cy="0"/>
+        </a:xfrm>
+      </p:grpSpPr>
+      <p:sp>
+        <p:nvSpPr>
+          <p:cNvPr id="2" name="Titre 1"/>
+          <p:cNvSpPr>
+            <a:spLocks noGrp="1"/>
+          </p:cNvSpPr>
+          <p:nvPr>
+            <p:ph type="title"/>
+          </p:nvPr>
+        </p:nvSpPr>
+        <p:spPr/>
+        <p:txBody>
+          <a:bodyPr/>
+          <a:lstStyle/>
+          <a:p>
+            <a:r>
+              <a:rPr lang="fr-FR" dirty="0" smtClean="0"/>
               <a:t>Estimation de tempo</a:t>
             </a:r>
             <a:endParaRPr lang="fr-FR" dirty="0"/>
@@ -8499,7 +11213,7 @@
           <a:p>
             <a:fld id="{AC23D0E6-50B7-48D2-8E06-55790222EDB8}" type="slidenum">
               <a:rPr lang="fr-FR" smtClean="0"/>
-              <a:t>6</a:t>
+              <a:t>8</a:t>
             </a:fld>
             <a:endParaRPr lang="fr-FR"/>
           </a:p>
@@ -9277,7 +11991,7 @@
 </p:sld>
 </file>
 
-<file path=ppt/slides/slide7.xml><?xml version="1.0" encoding="utf-8"?>
+<file path=ppt/slides/slide9.xml><?xml version="1.0" encoding="utf-8"?>
 <p:sld xmlns:a="http://schemas.openxmlformats.org/drawingml/2006/main" xmlns:r="http://schemas.openxmlformats.org/officeDocument/2006/relationships" xmlns:p="http://schemas.openxmlformats.org/presentationml/2006/main">
   <p:cSld>
     <p:spTree>
@@ -9425,7 +12139,7 @@
           <a:p>
             <a:fld id="{AC23D0E6-50B7-48D2-8E06-55790222EDB8}" type="slidenum">
               <a:rPr lang="fr-FR" smtClean="0"/>
-              <a:t>7</a:t>
+              <a:t>9</a:t>
             </a:fld>
             <a:endParaRPr lang="fr-FR"/>
           </a:p>
@@ -10144,1117 +12858,6 @@
     <p:extLst>
       <p:ext uri="{BB962C8B-B14F-4D97-AF65-F5344CB8AC3E}">
         <p14:creationId xmlns:p14="http://schemas.microsoft.com/office/powerpoint/2010/main" val="3603710872"/>
-      </p:ext>
-    </p:extLst>
-  </p:cSld>
-  <p:clrMapOvr>
-    <a:masterClrMapping/>
-  </p:clrMapOvr>
-</p:sld>
-</file>
-
-<file path=ppt/slides/slide8.xml><?xml version="1.0" encoding="utf-8"?>
-<p:sld xmlns:a="http://schemas.openxmlformats.org/drawingml/2006/main" xmlns:r="http://schemas.openxmlformats.org/officeDocument/2006/relationships" xmlns:p="http://schemas.openxmlformats.org/presentationml/2006/main">
-  <p:cSld>
-    <p:spTree>
-      <p:nvGrpSpPr>
-        <p:cNvPr id="1" name=""/>
-        <p:cNvGrpSpPr/>
-        <p:nvPr/>
-      </p:nvGrpSpPr>
-      <p:grpSpPr>
-        <a:xfrm>
-          <a:off x="0" y="0"/>
-          <a:ext cx="0" cy="0"/>
-          <a:chOff x="0" y="0"/>
-          <a:chExt cx="0" cy="0"/>
-        </a:xfrm>
-      </p:grpSpPr>
-      <p:sp>
-        <p:nvSpPr>
-          <p:cNvPr id="2" name="Titre 1"/>
-          <p:cNvSpPr>
-            <a:spLocks noGrp="1"/>
-          </p:cNvSpPr>
-          <p:nvPr>
-            <p:ph type="title"/>
-          </p:nvPr>
-        </p:nvSpPr>
-        <p:spPr/>
-        <p:txBody>
-          <a:bodyPr/>
-          <a:lstStyle/>
-          <a:p>
-            <a:r>
-              <a:rPr lang="fr-FR" dirty="0"/>
-              <a:t>Estimation de tempo</a:t>
-            </a:r>
-          </a:p>
-        </p:txBody>
-      </p:sp>
-      <p:sp>
-        <p:nvSpPr>
-          <p:cNvPr id="3" name="Espace réservé du contenu 2"/>
-          <p:cNvSpPr>
-            <a:spLocks noGrp="1"/>
-          </p:cNvSpPr>
-          <p:nvPr>
-            <p:ph idx="1"/>
-          </p:nvPr>
-        </p:nvSpPr>
-        <p:spPr>
-          <a:xfrm>
-            <a:off x="239185" y="1196976"/>
-            <a:ext cx="11713633" cy="1309461"/>
-          </a:xfrm>
-        </p:spPr>
-        <p:txBody>
-          <a:bodyPr/>
-          <a:lstStyle/>
-          <a:p>
-            <a:r>
-              <a:rPr lang="fr-FR" dirty="0" smtClean="0"/>
-              <a:t>Accumulation des résultats</a:t>
-            </a:r>
-            <a:endParaRPr lang="fr-FR" dirty="0"/>
-          </a:p>
-          <a:p>
-            <a:pPr lvl="1"/>
-            <a:r>
-              <a:rPr lang="fr-FR" sz="2000" dirty="0" smtClean="0"/>
-              <a:t>On garde un tempo par fenêtre</a:t>
-            </a:r>
-          </a:p>
-          <a:p>
-            <a:pPr lvl="1"/>
-            <a:r>
-              <a:rPr lang="fr-FR" sz="2000" dirty="0" smtClean="0"/>
-              <a:t>Pour chaque fenêtre, on construit une gaussienne autour du tempo choisi.</a:t>
-            </a:r>
-          </a:p>
-          <a:p>
-            <a:pPr lvl="1"/>
-            <a:endParaRPr lang="fr-FR" dirty="0"/>
-          </a:p>
-        </p:txBody>
-      </p:sp>
-      <p:sp>
-        <p:nvSpPr>
-          <p:cNvPr id="4" name="Espace réservé du pied de page 3"/>
-          <p:cNvSpPr>
-            <a:spLocks noGrp="1"/>
-          </p:cNvSpPr>
-          <p:nvPr>
-            <p:ph type="ftr" sz="quarter" idx="10"/>
-          </p:nvPr>
-        </p:nvSpPr>
-        <p:spPr/>
-        <p:txBody>
-          <a:bodyPr/>
-          <a:lstStyle/>
-          <a:p>
-            <a:r>
-              <a:rPr lang="fr-FR" smtClean="0"/>
-              <a:t>Projet de Fin d’étude – Générateur de Partition de de Musique – R. Gallard  - M.Laurent  - L.Riobé</a:t>
-            </a:r>
-            <a:endParaRPr lang="fr-FR"/>
-          </a:p>
-        </p:txBody>
-      </p:sp>
-      <p:sp>
-        <p:nvSpPr>
-          <p:cNvPr id="5" name="Espace réservé du numéro de diapositive 4"/>
-          <p:cNvSpPr>
-            <a:spLocks noGrp="1"/>
-          </p:cNvSpPr>
-          <p:nvPr>
-            <p:ph type="sldNum" sz="quarter" idx="11"/>
-          </p:nvPr>
-        </p:nvSpPr>
-        <p:spPr/>
-        <p:txBody>
-          <a:bodyPr/>
-          <a:lstStyle/>
-          <a:p>
-            <a:fld id="{AC23D0E6-50B7-48D2-8E06-55790222EDB8}" type="slidenum">
-              <a:rPr lang="fr-FR" smtClean="0"/>
-              <a:t>8</a:t>
-            </a:fld>
-            <a:endParaRPr lang="fr-FR"/>
-          </a:p>
-        </p:txBody>
-      </p:sp>
-      <p:pic>
-        <p:nvPicPr>
-          <p:cNvPr id="6" name="Image 5"/>
-          <p:cNvPicPr/>
-          <p:nvPr/>
-        </p:nvPicPr>
-        <p:blipFill rotWithShape="1">
-          <a:blip r:embed="rId3">
-            <a:extLst>
-              <a:ext uri="{28A0092B-C50C-407E-A947-70E740481C1C}">
-                <a14:useLocalDpi xmlns:a14="http://schemas.microsoft.com/office/drawing/2010/main" val="0"/>
-              </a:ext>
-            </a:extLst>
-          </a:blip>
-          <a:srcRect l="8674" t="4378" r="6606" b="5591"/>
-          <a:stretch/>
-        </p:blipFill>
-        <p:spPr bwMode="auto">
-          <a:xfrm>
-            <a:off x="239185" y="2411728"/>
-            <a:ext cx="4879975" cy="3497580"/>
-          </a:xfrm>
-          <a:prstGeom prst="rect">
-            <a:avLst/>
-          </a:prstGeom>
-          <a:ln>
-            <a:noFill/>
-          </a:ln>
-          <a:extLst>
-            <a:ext uri="{53640926-AAD7-44D8-BBD7-CCE9431645EC}">
-              <a14:shadowObscured xmlns:a14="http://schemas.microsoft.com/office/drawing/2010/main"/>
-            </a:ext>
-          </a:extLst>
-        </p:spPr>
-      </p:pic>
-      <p:grpSp>
-        <p:nvGrpSpPr>
-          <p:cNvPr id="10" name="Groupe 9"/>
-          <p:cNvGrpSpPr/>
-          <p:nvPr/>
-        </p:nvGrpSpPr>
-        <p:grpSpPr>
-          <a:xfrm>
-            <a:off x="5270380" y="3252650"/>
-            <a:ext cx="1651241" cy="1194969"/>
-            <a:chOff x="5520268" y="3448595"/>
-            <a:chExt cx="1651241" cy="1194969"/>
-          </a:xfrm>
-        </p:grpSpPr>
-        <p:sp>
-          <p:nvSpPr>
-            <p:cNvPr id="7" name="Flèche droite 6"/>
-            <p:cNvSpPr/>
-            <p:nvPr/>
-          </p:nvSpPr>
-          <p:spPr>
-            <a:xfrm>
-              <a:off x="5927877" y="3448595"/>
-              <a:ext cx="836023" cy="548640"/>
-            </a:xfrm>
-            <a:prstGeom prst="rightArrow">
-              <a:avLst/>
-            </a:prstGeom>
-          </p:spPr>
-          <p:style>
-            <a:lnRef idx="2">
-              <a:schemeClr val="accent6">
-                <a:shade val="50000"/>
-              </a:schemeClr>
-            </a:lnRef>
-            <a:fillRef idx="1">
-              <a:schemeClr val="accent6"/>
-            </a:fillRef>
-            <a:effectRef idx="0">
-              <a:schemeClr val="accent6"/>
-            </a:effectRef>
-            <a:fontRef idx="minor">
-              <a:schemeClr val="lt1"/>
-            </a:fontRef>
-          </p:style>
-          <p:txBody>
-            <a:bodyPr rtlCol="0" anchor="ctr"/>
-            <a:lstStyle/>
-            <a:p>
-              <a:pPr algn="ctr"/>
-              <a:endParaRPr lang="fr-FR" dirty="0"/>
-            </a:p>
-          </p:txBody>
-        </p:sp>
-        <p:sp>
-          <p:nvSpPr>
-            <p:cNvPr id="8" name="ZoneTexte 7"/>
-            <p:cNvSpPr txBox="1"/>
-            <p:nvPr/>
-          </p:nvSpPr>
-          <p:spPr>
-            <a:xfrm>
-              <a:off x="5520268" y="3997233"/>
-              <a:ext cx="1651241" cy="646331"/>
-            </a:xfrm>
-            <a:prstGeom prst="rect">
-              <a:avLst/>
-            </a:prstGeom>
-            <a:noFill/>
-          </p:spPr>
-          <p:txBody>
-            <a:bodyPr wrap="square" rtlCol="0">
-              <a:spAutoFit/>
-            </a:bodyPr>
-            <a:lstStyle/>
-            <a:p>
-              <a:pPr algn="ctr"/>
-              <a:r>
-                <a:rPr lang="fr-FR" dirty="0" smtClean="0"/>
-                <a:t>Somme + normalisation</a:t>
-              </a:r>
-              <a:endParaRPr lang="fr-FR" dirty="0"/>
-            </a:p>
-          </p:txBody>
-        </p:sp>
-      </p:grpSp>
-      <p:pic>
-        <p:nvPicPr>
-          <p:cNvPr id="9" name="Image 8"/>
-          <p:cNvPicPr/>
-          <p:nvPr/>
-        </p:nvPicPr>
-        <p:blipFill rotWithShape="1">
-          <a:blip r:embed="rId4">
-            <a:extLst>
-              <a:ext uri="{28A0092B-C50C-407E-A947-70E740481C1C}">
-                <a14:useLocalDpi xmlns:a14="http://schemas.microsoft.com/office/drawing/2010/main" val="0"/>
-              </a:ext>
-            </a:extLst>
-          </a:blip>
-          <a:srcRect l="9044" r="6424"/>
-          <a:stretch/>
-        </p:blipFill>
-        <p:spPr bwMode="auto">
-          <a:xfrm>
-            <a:off x="7001690" y="2560635"/>
-            <a:ext cx="4869180" cy="2742565"/>
-          </a:xfrm>
-          <a:prstGeom prst="rect">
-            <a:avLst/>
-          </a:prstGeom>
-          <a:ln>
-            <a:noFill/>
-          </a:ln>
-          <a:extLst>
-            <a:ext uri="{53640926-AAD7-44D8-BBD7-CCE9431645EC}">
-              <a14:shadowObscured xmlns:a14="http://schemas.microsoft.com/office/drawing/2010/main"/>
-            </a:ext>
-          </a:extLst>
-        </p:spPr>
-      </p:pic>
-      <p:sp>
-        <p:nvSpPr>
-          <p:cNvPr id="11" name="Espace réservé du contenu 2"/>
-          <p:cNvSpPr txBox="1">
-            <a:spLocks/>
-          </p:cNvSpPr>
-          <p:nvPr/>
-        </p:nvSpPr>
-        <p:spPr bwMode="auto">
-          <a:xfrm>
-            <a:off x="239185" y="5930537"/>
-            <a:ext cx="11713633" cy="535715"/>
-          </a:xfrm>
-          <a:prstGeom prst="rect">
-            <a:avLst/>
-          </a:prstGeom>
-          <a:noFill/>
-          <a:ln>
-            <a:noFill/>
-          </a:ln>
-          <a:effectLst/>
-          <a:extLst>
-            <a:ext uri="{909E8E84-426E-40DD-AFC4-6F175D3DCCD1}">
-              <a14:hiddenFill xmlns:a14="http://schemas.microsoft.com/office/drawing/2010/main">
-                <a:solidFill>
-                  <a:schemeClr val="accent1"/>
-                </a:solidFill>
-              </a14:hiddenFill>
-            </a:ext>
-            <a:ext uri="{91240B29-F687-4F45-9708-019B960494DF}">
-              <a14:hiddenLine xmlns:a14="http://schemas.microsoft.com/office/drawing/2010/main" w="9525">
-                <a:solidFill>
-                  <a:schemeClr val="tx1"/>
-                </a:solidFill>
-                <a:miter lim="800000"/>
-                <a:headEnd/>
-                <a:tailEnd/>
-              </a14:hiddenLine>
-            </a:ext>
-            <a:ext uri="{AF507438-7753-43E0-B8FC-AC1667EBCBE1}">
-              <a14:hiddenEffects xmlns:a14="http://schemas.microsoft.com/office/drawing/2010/main">
-                <a:effectLst>
-                  <a:outerShdw dist="35921" dir="2700000" algn="ctr" rotWithShape="0">
-                    <a:schemeClr val="bg2"/>
-                  </a:outerShdw>
-                </a:effectLst>
-              </a14:hiddenEffects>
-            </a:ext>
-          </a:extLst>
-        </p:spPr>
-        <p:txBody>
-          <a:bodyPr vert="horz" wrap="square" lIns="91440" tIns="45720" rIns="91440" bIns="45720" numCol="1" anchor="t" anchorCtr="0" compatLnSpc="1">
-            <a:prstTxWarp prst="textNoShape">
-              <a:avLst/>
-            </a:prstTxWarp>
-          </a:bodyPr>
-          <a:lstStyle>
-            <a:lvl1pPr marL="342900" indent="-342900" algn="l" rtl="0" eaLnBrk="1" fontAlgn="base" hangingPunct="1">
-              <a:spcBef>
-                <a:spcPct val="20000"/>
-              </a:spcBef>
-              <a:spcAft>
-                <a:spcPct val="0"/>
-              </a:spcAft>
-              <a:defRPr sz="2400" b="1" kern="1200">
-                <a:solidFill>
-                  <a:schemeClr val="accent2"/>
-                </a:solidFill>
-                <a:latin typeface="+mn-lt"/>
-                <a:ea typeface="+mn-ea"/>
-                <a:cs typeface="+mn-cs"/>
-              </a:defRPr>
-            </a:lvl1pPr>
-            <a:lvl2pPr marL="742950" indent="-285750" algn="l" rtl="0" eaLnBrk="1" fontAlgn="base" hangingPunct="1">
-              <a:spcBef>
-                <a:spcPct val="20000"/>
-              </a:spcBef>
-              <a:spcAft>
-                <a:spcPct val="0"/>
-              </a:spcAft>
-              <a:defRPr sz="2400" kern="1200">
-                <a:solidFill>
-                  <a:schemeClr val="tx1"/>
-                </a:solidFill>
-                <a:latin typeface="+mn-lt"/>
-                <a:ea typeface="+mn-ea"/>
-                <a:cs typeface="+mn-cs"/>
-              </a:defRPr>
-            </a:lvl2pPr>
-            <a:lvl3pPr marL="1143000" indent="-228600" algn="l" rtl="0" eaLnBrk="1" fontAlgn="base" hangingPunct="1">
-              <a:spcBef>
-                <a:spcPct val="20000"/>
-              </a:spcBef>
-              <a:spcAft>
-                <a:spcPct val="0"/>
-              </a:spcAft>
-              <a:buChar char="•"/>
-              <a:defRPr sz="2400" kern="1200">
-                <a:solidFill>
-                  <a:schemeClr val="tx1"/>
-                </a:solidFill>
-                <a:latin typeface="+mn-lt"/>
-                <a:ea typeface="+mn-ea"/>
-                <a:cs typeface="+mn-cs"/>
-              </a:defRPr>
-            </a:lvl3pPr>
-            <a:lvl4pPr marL="1600200" indent="-228600" algn="l" rtl="0" eaLnBrk="1" fontAlgn="base" hangingPunct="1">
-              <a:spcBef>
-                <a:spcPct val="20000"/>
-              </a:spcBef>
-              <a:spcAft>
-                <a:spcPct val="0"/>
-              </a:spcAft>
-              <a:defRPr sz="2400" kern="1200">
-                <a:solidFill>
-                  <a:schemeClr val="tx1"/>
-                </a:solidFill>
-                <a:latin typeface="+mn-lt"/>
-                <a:ea typeface="+mn-ea"/>
-                <a:cs typeface="+mn-cs"/>
-              </a:defRPr>
-            </a:lvl4pPr>
-            <a:lvl5pPr marL="2057400" indent="-228600" algn="l" rtl="0" eaLnBrk="1" fontAlgn="base" hangingPunct="1">
-              <a:spcBef>
-                <a:spcPct val="20000"/>
-              </a:spcBef>
-              <a:spcAft>
-                <a:spcPct val="0"/>
-              </a:spcAft>
-              <a:buChar char="»"/>
-              <a:defRPr sz="2400" kern="1200">
-                <a:solidFill>
-                  <a:schemeClr val="tx1"/>
-                </a:solidFill>
-                <a:latin typeface="+mn-lt"/>
-                <a:ea typeface="+mn-ea"/>
-                <a:cs typeface="+mn-cs"/>
-              </a:defRPr>
-            </a:lvl5pPr>
-            <a:lvl6pPr marL="2514600" indent="-228600" algn="l" defTabSz="914400" rtl="0" eaLnBrk="1" latinLnBrk="0" hangingPunct="1">
-              <a:lnSpc>
-                <a:spcPct val="90000"/>
-              </a:lnSpc>
-              <a:spcBef>
-                <a:spcPts val="500"/>
-              </a:spcBef>
-              <a:buFont typeface="Arial" panose="020B0604020202020204" pitchFamily="34" charset="0"/>
-              <a:buChar char="•"/>
-              <a:defRPr sz="1800" kern="1200">
-                <a:solidFill>
-                  <a:schemeClr val="tx1"/>
-                </a:solidFill>
-                <a:latin typeface="+mn-lt"/>
-                <a:ea typeface="+mn-ea"/>
-                <a:cs typeface="+mn-cs"/>
-              </a:defRPr>
-            </a:lvl6pPr>
-            <a:lvl7pPr marL="2971800" indent="-228600" algn="l" defTabSz="914400" rtl="0" eaLnBrk="1" latinLnBrk="0" hangingPunct="1">
-              <a:lnSpc>
-                <a:spcPct val="90000"/>
-              </a:lnSpc>
-              <a:spcBef>
-                <a:spcPts val="500"/>
-              </a:spcBef>
-              <a:buFont typeface="Arial" panose="020B0604020202020204" pitchFamily="34" charset="0"/>
-              <a:buChar char="•"/>
-              <a:defRPr sz="1800" kern="1200">
-                <a:solidFill>
-                  <a:schemeClr val="tx1"/>
-                </a:solidFill>
-                <a:latin typeface="+mn-lt"/>
-                <a:ea typeface="+mn-ea"/>
-                <a:cs typeface="+mn-cs"/>
-              </a:defRPr>
-            </a:lvl7pPr>
-            <a:lvl8pPr marL="3429000" indent="-228600" algn="l" defTabSz="914400" rtl="0" eaLnBrk="1" latinLnBrk="0" hangingPunct="1">
-              <a:lnSpc>
-                <a:spcPct val="90000"/>
-              </a:lnSpc>
-              <a:spcBef>
-                <a:spcPts val="500"/>
-              </a:spcBef>
-              <a:buFont typeface="Arial" panose="020B0604020202020204" pitchFamily="34" charset="0"/>
-              <a:buChar char="•"/>
-              <a:defRPr sz="1800" kern="1200">
-                <a:solidFill>
-                  <a:schemeClr val="tx1"/>
-                </a:solidFill>
-                <a:latin typeface="+mn-lt"/>
-                <a:ea typeface="+mn-ea"/>
-                <a:cs typeface="+mn-cs"/>
-              </a:defRPr>
-            </a:lvl8pPr>
-            <a:lvl9pPr marL="3886200" indent="-228600" algn="l" defTabSz="914400" rtl="0" eaLnBrk="1" latinLnBrk="0" hangingPunct="1">
-              <a:lnSpc>
-                <a:spcPct val="90000"/>
-              </a:lnSpc>
-              <a:spcBef>
-                <a:spcPts val="500"/>
-              </a:spcBef>
-              <a:buFont typeface="Arial" panose="020B0604020202020204" pitchFamily="34" charset="0"/>
-              <a:buChar char="•"/>
-              <a:defRPr sz="1800" kern="1200">
-                <a:solidFill>
-                  <a:schemeClr val="tx1"/>
-                </a:solidFill>
-                <a:latin typeface="+mn-lt"/>
-                <a:ea typeface="+mn-ea"/>
-                <a:cs typeface="+mn-cs"/>
-              </a:defRPr>
-            </a:lvl9pPr>
-          </a:lstStyle>
-          <a:p>
-            <a:r>
-              <a:rPr lang="fr-FR" sz="1400" dirty="0" smtClean="0"/>
-              <a:t>G. </a:t>
-            </a:r>
-            <a:r>
-              <a:rPr lang="fr-FR" sz="1400" dirty="0" err="1" smtClean="0"/>
-              <a:t>Percival</a:t>
-            </a:r>
-            <a:r>
-              <a:rPr lang="fr-FR" sz="1400" dirty="0" smtClean="0"/>
-              <a:t>, G </a:t>
-            </a:r>
-            <a:r>
-              <a:rPr lang="fr-FR" sz="1400" dirty="0" err="1" smtClean="0"/>
-              <a:t>Tzanetakis</a:t>
-            </a:r>
-            <a:r>
-              <a:rPr lang="fr-FR" sz="1400" dirty="0" smtClean="0"/>
-              <a:t>, « </a:t>
-            </a:r>
-            <a:r>
-              <a:rPr lang="en-US" sz="1400" dirty="0" smtClean="0"/>
-              <a:t>Streamlined Tempo Estimation Based on Autocorrelation and Cross-correlation With Pulses</a:t>
-            </a:r>
-            <a:r>
-              <a:rPr lang="fr-FR" sz="1400" dirty="0" smtClean="0"/>
-              <a:t> », </a:t>
-            </a:r>
-            <a:r>
-              <a:rPr lang="en-US" sz="1400" i="1" dirty="0" smtClean="0"/>
-              <a:t>﻿IEEE/ACM TRANSACTIONS ON AUDIO, SPEECH, AND LANGUAGE PROCESSING</a:t>
-            </a:r>
-            <a:r>
-              <a:rPr lang="fr-FR" sz="1400" dirty="0" smtClean="0"/>
-              <a:t>, 2014</a:t>
-            </a:r>
-            <a:endParaRPr lang="fr-FR" sz="1400" i="1" dirty="0"/>
-          </a:p>
-        </p:txBody>
-      </p:sp>
-    </p:spTree>
-    <p:extLst>
-      <p:ext uri="{BB962C8B-B14F-4D97-AF65-F5344CB8AC3E}">
-        <p14:creationId xmlns:p14="http://schemas.microsoft.com/office/powerpoint/2010/main" val="2858421720"/>
-      </p:ext>
-    </p:extLst>
-  </p:cSld>
-  <p:clrMapOvr>
-    <a:masterClrMapping/>
-  </p:clrMapOvr>
-</p:sld>
-</file>
-
-<file path=ppt/slides/slide9.xml><?xml version="1.0" encoding="utf-8"?>
-<p:sld xmlns:a="http://schemas.openxmlformats.org/drawingml/2006/main" xmlns:r="http://schemas.openxmlformats.org/officeDocument/2006/relationships" xmlns:p="http://schemas.openxmlformats.org/presentationml/2006/main">
-  <p:cSld>
-    <p:spTree>
-      <p:nvGrpSpPr>
-        <p:cNvPr id="1" name=""/>
-        <p:cNvGrpSpPr/>
-        <p:nvPr/>
-      </p:nvGrpSpPr>
-      <p:grpSpPr>
-        <a:xfrm>
-          <a:off x="0" y="0"/>
-          <a:ext cx="0" cy="0"/>
-          <a:chOff x="0" y="0"/>
-          <a:chExt cx="0" cy="0"/>
-        </a:xfrm>
-      </p:grpSpPr>
-      <p:sp>
-        <p:nvSpPr>
-          <p:cNvPr id="2" name="Titre 1"/>
-          <p:cNvSpPr>
-            <a:spLocks noGrp="1"/>
-          </p:cNvSpPr>
-          <p:nvPr>
-            <p:ph type="title"/>
-          </p:nvPr>
-        </p:nvSpPr>
-        <p:spPr/>
-        <p:txBody>
-          <a:bodyPr/>
-          <a:lstStyle/>
-          <a:p>
-            <a:r>
-              <a:rPr lang="fr-FR" dirty="0"/>
-              <a:t>Estimation de tempo</a:t>
-            </a:r>
-          </a:p>
-        </p:txBody>
-      </p:sp>
-      <p:sp>
-        <p:nvSpPr>
-          <p:cNvPr id="4" name="Espace réservé du pied de page 3"/>
-          <p:cNvSpPr>
-            <a:spLocks noGrp="1"/>
-          </p:cNvSpPr>
-          <p:nvPr>
-            <p:ph type="ftr" sz="quarter" idx="10"/>
-          </p:nvPr>
-        </p:nvSpPr>
-        <p:spPr/>
-        <p:txBody>
-          <a:bodyPr/>
-          <a:lstStyle/>
-          <a:p>
-            <a:r>
-              <a:rPr lang="fr-FR" smtClean="0"/>
-              <a:t>Projet de Fin d’étude – Générateur de Partition de de Musique – R. Gallard  - M.Laurent  - L.Riobé</a:t>
-            </a:r>
-            <a:endParaRPr lang="fr-FR"/>
-          </a:p>
-        </p:txBody>
-      </p:sp>
-      <p:sp>
-        <p:nvSpPr>
-          <p:cNvPr id="5" name="Espace réservé du numéro de diapositive 4"/>
-          <p:cNvSpPr>
-            <a:spLocks noGrp="1"/>
-          </p:cNvSpPr>
-          <p:nvPr>
-            <p:ph type="sldNum" sz="quarter" idx="11"/>
-          </p:nvPr>
-        </p:nvSpPr>
-        <p:spPr/>
-        <p:txBody>
-          <a:bodyPr/>
-          <a:lstStyle/>
-          <a:p>
-            <a:fld id="{AC23D0E6-50B7-48D2-8E06-55790222EDB8}" type="slidenum">
-              <a:rPr lang="fr-FR" smtClean="0"/>
-              <a:t>9</a:t>
-            </a:fld>
-            <a:endParaRPr lang="fr-FR"/>
-          </a:p>
-        </p:txBody>
-      </p:sp>
-      <mc:AlternateContent xmlns:mc="http://schemas.openxmlformats.org/markup-compatibility/2006" xmlns:a14="http://schemas.microsoft.com/office/drawing/2010/main">
-        <mc:Choice Requires="a14">
-          <p:sp>
-            <p:nvSpPr>
-              <p:cNvPr id="12" name="Espace réservé du contenu 11"/>
-              <p:cNvSpPr>
-                <a:spLocks noGrp="1"/>
-              </p:cNvSpPr>
-              <p:nvPr>
-                <p:ph idx="1"/>
-              </p:nvPr>
-            </p:nvSpPr>
-            <p:spPr>
-              <a:xfrm>
-                <a:off x="239185" y="1196976"/>
-                <a:ext cx="11713633" cy="2565127"/>
-              </a:xfrm>
-            </p:spPr>
-            <p:txBody>
-              <a:bodyPr/>
-              <a:lstStyle/>
-              <a:p>
-                <a:r>
-                  <a:rPr lang="fr-FR" dirty="0" smtClean="0"/>
-                  <a:t>Choix du tempo général</a:t>
-                </a:r>
-              </a:p>
-              <a:p>
-                <a:pPr marL="800100" lvl="1" indent="-342900">
-                  <a:buFont typeface="Arial" panose="020B0604020202020204" pitchFamily="34" charset="0"/>
-                  <a:buChar char="•"/>
-                </a:pPr>
-                <a:r>
-                  <a:rPr lang="fr-FR" dirty="0" smtClean="0"/>
-                  <a:t>Extraction de tous les pics en tant que tempos candidats</a:t>
-                </a:r>
-              </a:p>
-              <a:p>
-                <a:pPr marL="800100" lvl="1" indent="-342900">
-                  <a:buFont typeface="Arial" panose="020B0604020202020204" pitchFamily="34" charset="0"/>
-                  <a:buChar char="•"/>
-                </a:pPr>
-                <a:r>
-                  <a:rPr lang="fr-FR" dirty="0" smtClean="0"/>
-                  <a:t>Utilisation de l’algorithme d’analyse rythmique qui attribue un taux de confiance pour la durée de chaque note: </a:t>
-                </a:r>
-                <a14:m>
-                  <m:oMath xmlns:m="http://schemas.openxmlformats.org/officeDocument/2006/math">
-                    <m:r>
-                      <a:rPr lang="fr-FR" i="1">
-                        <a:latin typeface="Cambria Math" panose="02040503050406030204" pitchFamily="18" charset="0"/>
-                      </a:rPr>
-                      <m:t>𝜇</m:t>
-                    </m:r>
-                    <m:r>
-                      <a:rPr lang="fr-FR" i="1">
-                        <a:latin typeface="Cambria Math" panose="02040503050406030204" pitchFamily="18" charset="0"/>
-                      </a:rPr>
-                      <m:t>(</m:t>
-                    </m:r>
-                    <m:r>
-                      <a:rPr lang="fr-FR" i="1">
-                        <a:latin typeface="Cambria Math" panose="02040503050406030204" pitchFamily="18" charset="0"/>
-                      </a:rPr>
-                      <m:t>𝜏</m:t>
-                    </m:r>
-                    <m:r>
-                      <a:rPr lang="fr-FR" i="1">
-                        <a:latin typeface="Cambria Math" panose="02040503050406030204" pitchFamily="18" charset="0"/>
-                      </a:rPr>
-                      <m:t>)=</m:t>
-                    </m:r>
-                    <m:f>
-                      <m:fPr>
-                        <m:ctrlPr>
-                          <a:rPr lang="fr-FR" i="1">
-                            <a:latin typeface="Cambria Math" panose="02040503050406030204" pitchFamily="18" charset="0"/>
-                          </a:rPr>
-                        </m:ctrlPr>
-                      </m:fPr>
-                      <m:num>
-                        <m:r>
-                          <a:rPr lang="fr-FR" i="1">
-                            <a:latin typeface="Cambria Math" panose="02040503050406030204" pitchFamily="18" charset="0"/>
-                          </a:rPr>
-                          <m:t>1</m:t>
-                        </m:r>
-                      </m:num>
-                      <m:den>
-                        <m:r>
-                          <a:rPr lang="fr-FR" i="1">
-                            <a:latin typeface="Cambria Math" panose="02040503050406030204" pitchFamily="18" charset="0"/>
-                          </a:rPr>
-                          <m:t>𝑁</m:t>
-                        </m:r>
-                      </m:den>
-                    </m:f>
-                    <m:nary>
-                      <m:naryPr>
-                        <m:chr m:val="∑"/>
-                        <m:limLoc m:val="undOvr"/>
-                        <m:ctrlPr>
-                          <a:rPr lang="fr-FR" i="1">
-                            <a:latin typeface="Cambria Math" panose="02040503050406030204" pitchFamily="18" charset="0"/>
-                          </a:rPr>
-                        </m:ctrlPr>
-                      </m:naryPr>
-                      <m:sub>
-                        <m:r>
-                          <a:rPr lang="fr-FR" i="1">
-                            <a:latin typeface="Cambria Math" panose="02040503050406030204" pitchFamily="18" charset="0"/>
-                          </a:rPr>
-                          <m:t>𝑛</m:t>
-                        </m:r>
-                        <m:r>
-                          <a:rPr lang="fr-FR" i="1">
-                            <a:latin typeface="Cambria Math" panose="02040503050406030204" pitchFamily="18" charset="0"/>
-                          </a:rPr>
-                          <m:t>=1</m:t>
-                        </m:r>
-                      </m:sub>
-                      <m:sup>
-                        <m:r>
-                          <a:rPr lang="fr-FR" i="1">
-                            <a:latin typeface="Cambria Math" panose="02040503050406030204" pitchFamily="18" charset="0"/>
-                          </a:rPr>
-                          <m:t>𝑁</m:t>
-                        </m:r>
-                      </m:sup>
-                      <m:e>
-                        <m:r>
-                          <a:rPr lang="fr-FR" i="1">
-                            <a:latin typeface="Cambria Math" panose="02040503050406030204" pitchFamily="18" charset="0"/>
-                          </a:rPr>
-                          <m:t>𝑝</m:t>
-                        </m:r>
-                        <m:r>
-                          <a:rPr lang="fr-FR" i="1">
-                            <a:latin typeface="Cambria Math" panose="02040503050406030204" pitchFamily="18" charset="0"/>
-                          </a:rPr>
-                          <m:t>(</m:t>
-                        </m:r>
-                        <m:r>
-                          <a:rPr lang="fr-FR" i="1">
-                            <a:latin typeface="Cambria Math" panose="02040503050406030204" pitchFamily="18" charset="0"/>
-                          </a:rPr>
-                          <m:t>𝑛</m:t>
-                        </m:r>
-                        <m:r>
-                          <a:rPr lang="fr-FR" i="1">
-                            <a:latin typeface="Cambria Math" panose="02040503050406030204" pitchFamily="18" charset="0"/>
-                          </a:rPr>
-                          <m:t>|</m:t>
-                        </m:r>
-                        <m:r>
-                          <a:rPr lang="fr-FR" i="1">
-                            <a:latin typeface="Cambria Math" panose="02040503050406030204" pitchFamily="18" charset="0"/>
-                          </a:rPr>
-                          <m:t>𝜏</m:t>
-                        </m:r>
-                        <m:r>
-                          <a:rPr lang="fr-FR" i="1">
-                            <a:latin typeface="Cambria Math" panose="02040503050406030204" pitchFamily="18" charset="0"/>
-                          </a:rPr>
-                          <m:t>)</m:t>
-                        </m:r>
-                      </m:e>
-                    </m:nary>
-                  </m:oMath>
-                </a14:m>
-                <a:endParaRPr lang="fr-FR" dirty="0" smtClean="0"/>
-              </a:p>
-              <a:p>
-                <a:pPr marL="800100" lvl="1" indent="-342900">
-                  <a:buFont typeface="Arial" panose="020B0604020202020204" pitchFamily="34" charset="0"/>
-                  <a:buChar char="•"/>
-                </a:pPr>
-                <a:r>
-                  <a:rPr lang="fr-FR" dirty="0" smtClean="0"/>
-                  <a:t>Prise en compte de la fréquence d’apparition de chaque durées</a:t>
-                </a:r>
-                <a:endParaRPr lang="fr-FR" dirty="0"/>
-              </a:p>
-              <a:p>
-                <a:pPr marL="800100" lvl="1" indent="-342900">
-                  <a:buFont typeface="Arial" panose="020B0604020202020204" pitchFamily="34" charset="0"/>
-                  <a:buChar char="•"/>
-                </a:pPr>
-                <a:endParaRPr lang="fr-FR" dirty="0" smtClean="0"/>
-              </a:p>
-            </p:txBody>
-          </p:sp>
-        </mc:Choice>
-        <mc:Fallback xmlns="">
-          <p:sp>
-            <p:nvSpPr>
-              <p:cNvPr id="12" name="Espace réservé du contenu 11"/>
-              <p:cNvSpPr>
-                <a:spLocks noGrp="1" noRot="1" noChangeAspect="1" noMove="1" noResize="1" noEditPoints="1" noAdjustHandles="1" noChangeArrowheads="1" noChangeShapeType="1" noTextEdit="1"/>
-              </p:cNvSpPr>
-              <p:nvPr>
-                <p:ph idx="1"/>
-              </p:nvPr>
-            </p:nvSpPr>
-            <p:spPr>
-              <a:xfrm>
-                <a:off x="239185" y="1196976"/>
-                <a:ext cx="11713633" cy="2565127"/>
-              </a:xfrm>
-              <a:blipFill rotWithShape="0">
-                <a:blip r:embed="rId3"/>
-                <a:stretch>
-                  <a:fillRect l="-780" t="-1663" r="-1145"/>
-                </a:stretch>
-              </a:blipFill>
-            </p:spPr>
-            <p:txBody>
-              <a:bodyPr/>
-              <a:lstStyle/>
-              <a:p>
-                <a:r>
-                  <a:rPr lang="fr-FR">
-                    <a:noFill/>
-                  </a:rPr>
-                  <a:t> </a:t>
-                </a:r>
-              </a:p>
-            </p:txBody>
-          </p:sp>
-        </mc:Fallback>
-      </mc:AlternateContent>
-      <p:sp>
-        <p:nvSpPr>
-          <p:cNvPr id="13" name="ZoneTexte 12"/>
-          <p:cNvSpPr txBox="1"/>
-          <p:nvPr/>
-        </p:nvSpPr>
-        <p:spPr>
-          <a:xfrm>
-            <a:off x="2804160" y="4472298"/>
-            <a:ext cx="6583680" cy="461665"/>
-          </a:xfrm>
-          <a:prstGeom prst="rect">
-            <a:avLst/>
-          </a:prstGeom>
-          <a:noFill/>
-          <a:ln>
-            <a:noFill/>
-          </a:ln>
-          <a:effectLst/>
-          <a:extLst>
-            <a:ext uri="{909E8E84-426E-40DD-AFC4-6F175D3DCCD1}">
-              <a14:hiddenFill xmlns:a14="http://schemas.microsoft.com/office/drawing/2010/main">
-                <a:solidFill>
-                  <a:schemeClr val="accent1"/>
-                </a:solidFill>
-              </a14:hiddenFill>
-            </a:ext>
-            <a:ext uri="{91240B29-F687-4F45-9708-019B960494DF}">
-              <a14:hiddenLine xmlns:a14="http://schemas.microsoft.com/office/drawing/2010/main" w="9525">
-                <a:solidFill>
-                  <a:schemeClr val="tx1"/>
-                </a:solidFill>
-                <a:miter lim="800000"/>
-                <a:headEnd/>
-                <a:tailEnd/>
-              </a14:hiddenLine>
-            </a:ext>
-            <a:ext uri="{AF507438-7753-43E0-B8FC-AC1667EBCBE1}">
-              <a14:hiddenEffects xmlns:a14="http://schemas.microsoft.com/office/drawing/2010/main">
-                <a:effectLst>
-                  <a:outerShdw dist="35921" dir="2700000" algn="ctr" rotWithShape="0">
-                    <a:schemeClr val="bg2"/>
-                  </a:outerShdw>
-                </a:effectLst>
-              </a14:hiddenEffects>
-            </a:ext>
-          </a:extLst>
-        </p:spPr>
-        <p:txBody>
-          <a:bodyPr vert="horz" wrap="square" lIns="91440" tIns="45720" rIns="91440" bIns="45720" numCol="1" anchor="t" anchorCtr="0" compatLnSpc="1">
-            <a:prstTxWarp prst="textNoShape">
-              <a:avLst/>
-            </a:prstTxWarp>
-          </a:bodyPr>
-          <a:lstStyle>
-            <a:lvl1pPr marL="342900" indent="-342900" fontAlgn="base">
-              <a:spcBef>
-                <a:spcPct val="20000"/>
-              </a:spcBef>
-              <a:spcAft>
-                <a:spcPct val="0"/>
-              </a:spcAft>
-              <a:defRPr sz="2400" b="1">
-                <a:solidFill>
-                  <a:schemeClr val="accent2"/>
-                </a:solidFill>
-              </a:defRPr>
-            </a:lvl1pPr>
-            <a:lvl2pPr marL="800100" lvl="1" indent="-342900" fontAlgn="base">
-              <a:spcBef>
-                <a:spcPct val="20000"/>
-              </a:spcBef>
-              <a:spcAft>
-                <a:spcPct val="0"/>
-              </a:spcAft>
-              <a:buFont typeface="Arial" panose="020B0604020202020204" pitchFamily="34" charset="0"/>
-              <a:buChar char="•"/>
-              <a:defRPr sz="2400"/>
-            </a:lvl2pPr>
-            <a:lvl3pPr marL="1143000" indent="-228600" fontAlgn="base">
-              <a:spcBef>
-                <a:spcPct val="20000"/>
-              </a:spcBef>
-              <a:spcAft>
-                <a:spcPct val="0"/>
-              </a:spcAft>
-              <a:buChar char="•"/>
-              <a:defRPr sz="2400"/>
-            </a:lvl3pPr>
-            <a:lvl4pPr marL="1600200" indent="-228600" fontAlgn="base">
-              <a:spcBef>
-                <a:spcPct val="20000"/>
-              </a:spcBef>
-              <a:spcAft>
-                <a:spcPct val="0"/>
-              </a:spcAft>
-              <a:defRPr sz="2400"/>
-            </a:lvl4pPr>
-            <a:lvl5pPr marL="2057400" indent="-228600" fontAlgn="base">
-              <a:spcBef>
-                <a:spcPct val="20000"/>
-              </a:spcBef>
-              <a:spcAft>
-                <a:spcPct val="0"/>
-              </a:spcAft>
-              <a:buChar char="»"/>
-              <a:defRPr sz="2400"/>
-            </a:lvl5pPr>
-            <a:lvl6pPr marL="2514600" indent="-228600">
-              <a:lnSpc>
-                <a:spcPct val="90000"/>
-              </a:lnSpc>
-              <a:spcBef>
-                <a:spcPts val="500"/>
-              </a:spcBef>
-              <a:buFont typeface="Arial" panose="020B0604020202020204" pitchFamily="34" charset="0"/>
-              <a:buChar char="•"/>
-            </a:lvl6pPr>
-            <a:lvl7pPr marL="2971800" indent="-228600">
-              <a:lnSpc>
-                <a:spcPct val="90000"/>
-              </a:lnSpc>
-              <a:spcBef>
-                <a:spcPts val="500"/>
-              </a:spcBef>
-              <a:buFont typeface="Arial" panose="020B0604020202020204" pitchFamily="34" charset="0"/>
-              <a:buChar char="•"/>
-            </a:lvl7pPr>
-            <a:lvl8pPr marL="3429000" indent="-228600">
-              <a:lnSpc>
-                <a:spcPct val="90000"/>
-              </a:lnSpc>
-              <a:spcBef>
-                <a:spcPts val="500"/>
-              </a:spcBef>
-              <a:buFont typeface="Arial" panose="020B0604020202020204" pitchFamily="34" charset="0"/>
-              <a:buChar char="•"/>
-            </a:lvl8pPr>
-            <a:lvl9pPr marL="3886200" indent="-228600">
-              <a:lnSpc>
-                <a:spcPct val="90000"/>
-              </a:lnSpc>
-              <a:spcBef>
-                <a:spcPts val="500"/>
-              </a:spcBef>
-              <a:buFont typeface="Arial" panose="020B0604020202020204" pitchFamily="34" charset="0"/>
-              <a:buChar char="•"/>
-            </a:lvl9pPr>
-          </a:lstStyle>
-          <a:p>
-            <a:pPr algn="ctr"/>
-            <a:r>
-              <a:rPr lang="fr-FR" dirty="0" smtClean="0"/>
-              <a:t>Choix du tempo</a:t>
-            </a:r>
-            <a:endParaRPr lang="fr-FR" dirty="0"/>
-          </a:p>
-        </p:txBody>
-      </p:sp>
-      <p:sp>
-        <p:nvSpPr>
-          <p:cNvPr id="14" name="Flèche droite 13"/>
-          <p:cNvSpPr/>
-          <p:nvPr/>
-        </p:nvSpPr>
-        <p:spPr>
-          <a:xfrm rot="5400000">
-            <a:off x="5560422" y="3714252"/>
-            <a:ext cx="836023" cy="548640"/>
-          </a:xfrm>
-          <a:prstGeom prst="rightArrow">
-            <a:avLst/>
-          </a:prstGeom>
-        </p:spPr>
-        <p:style>
-          <a:lnRef idx="2">
-            <a:schemeClr val="accent6">
-              <a:shade val="50000"/>
-            </a:schemeClr>
-          </a:lnRef>
-          <a:fillRef idx="1">
-            <a:schemeClr val="accent6"/>
-          </a:fillRef>
-          <a:effectRef idx="0">
-            <a:schemeClr val="accent6"/>
-          </a:effectRef>
-          <a:fontRef idx="minor">
-            <a:schemeClr val="lt1"/>
-          </a:fontRef>
-        </p:style>
-        <p:txBody>
-          <a:bodyPr rtlCol="0" anchor="ctr"/>
-          <a:lstStyle/>
-          <a:p>
-            <a:pPr algn="ctr"/>
-            <a:endParaRPr lang="fr-FR" dirty="0"/>
-          </a:p>
-        </p:txBody>
-      </p:sp>
-      <p:sp>
-        <p:nvSpPr>
-          <p:cNvPr id="15" name="ZoneTexte 14"/>
-          <p:cNvSpPr txBox="1"/>
-          <p:nvPr/>
-        </p:nvSpPr>
-        <p:spPr>
-          <a:xfrm>
-            <a:off x="1423187" y="5395628"/>
-            <a:ext cx="9953897" cy="646331"/>
-          </a:xfrm>
-          <a:prstGeom prst="rect">
-            <a:avLst/>
-          </a:prstGeom>
-          <a:noFill/>
-        </p:spPr>
-        <p:txBody>
-          <a:bodyPr wrap="square" rtlCol="0">
-            <a:spAutoFit/>
-          </a:bodyPr>
-          <a:lstStyle/>
-          <a:p>
-            <a:r>
-              <a:rPr lang="fr-FR" dirty="0" smtClean="0"/>
-              <a:t>Le tempo est un critère de notation subjectif qui peut dépendre d’un choix personnel de la personne qui écrit la partition (tempo à la noire, à la croche, etc…)</a:t>
-            </a:r>
-            <a:endParaRPr lang="fr-FR" dirty="0"/>
-          </a:p>
-        </p:txBody>
-      </p:sp>
-    </p:spTree>
-    <p:extLst>
-      <p:ext uri="{BB962C8B-B14F-4D97-AF65-F5344CB8AC3E}">
-        <p14:creationId xmlns:p14="http://schemas.microsoft.com/office/powerpoint/2010/main" val="3752303451"/>
       </p:ext>
     </p:extLst>
   </p:cSld>

</xml_diff>